<commit_message>
Ant room map created.
</commit_message>
<xml_diff>
--- a/test/Lem-in_Maps.pptx
+++ b/test/Lem-in_Maps.pptx
@@ -10,6 +10,7 @@
     <p:sldId id="258" r:id="rId4"/>
     <p:sldId id="260" r:id="rId5"/>
     <p:sldId id="259" r:id="rId6"/>
+    <p:sldId id="261" r:id="rId7"/>
   </p:sldIdLst>
   <p:sldSz cx="12192000" cy="6858000"/>
   <p:notesSz cx="6858000" cy="9144000"/>
@@ -111,8 +112,416 @@
 </p:presentation>
 </file>
 
+<file path=ppt/revisionInfo.xml><?xml version="1.0" encoding="utf-8"?>
+<p1510:revInfo xmlns:a="http://schemas.openxmlformats.org/drawingml/2006/main" xmlns:r="http://schemas.openxmlformats.org/officeDocument/2006/relationships" xmlns:p1510="http://schemas.microsoft.com/office/powerpoint/2015/10/main">
+  <p1510:revLst>
+    <p1510:client id="{8D97EE2B-F11E-4765-8922-6160B3708960}" v="14" dt="2020-04-12T12:23:36.702"/>
+  </p1510:revLst>
+</p1510:revInfo>
+</file>
+
 <file path=ppt/changesInfos/changesInfo1.xml><?xml version="1.0" encoding="utf-8"?>
 <pc:chgInfo xmlns:a="http://schemas.openxmlformats.org/drawingml/2006/main" xmlns:r="http://schemas.openxmlformats.org/officeDocument/2006/relationships" xmlns:ac="http://schemas.microsoft.com/office/drawing/2013/main/command" xmlns:pc="http://schemas.microsoft.com/office/powerpoint/2013/main/command">
+  <pc:docChgLst>
+    <pc:chgData name="Juhani Kauppi" userId="7aea86bdef93781e" providerId="LiveId" clId="{8D97EE2B-F11E-4765-8922-6160B3708960}"/>
+    <pc:docChg chg="undo custSel addSld modSld">
+      <pc:chgData name="Juhani Kauppi" userId="7aea86bdef93781e" providerId="LiveId" clId="{8D97EE2B-F11E-4765-8922-6160B3708960}" dt="2020-04-12T12:37:48.882" v="140" actId="14100"/>
+      <pc:docMkLst>
+        <pc:docMk/>
+      </pc:docMkLst>
+      <pc:sldChg chg="addSp delSp modSp add">
+        <pc:chgData name="Juhani Kauppi" userId="7aea86bdef93781e" providerId="LiveId" clId="{8D97EE2B-F11E-4765-8922-6160B3708960}" dt="2020-04-12T12:37:48.882" v="140" actId="14100"/>
+        <pc:sldMkLst>
+          <pc:docMk/>
+          <pc:sldMk cId="4169295361" sldId="261"/>
+        </pc:sldMkLst>
+        <pc:spChg chg="mod">
+          <ac:chgData name="Juhani Kauppi" userId="7aea86bdef93781e" providerId="LiveId" clId="{8D97EE2B-F11E-4765-8922-6160B3708960}" dt="2020-04-12T12:31:36.970" v="128" actId="20577"/>
+          <ac:spMkLst>
+            <pc:docMk/>
+            <pc:sldMk cId="4169295361" sldId="261"/>
+            <ac:spMk id="2" creationId="{9C642A9D-54C3-9D48-B3D4-776EF7C0B35F}"/>
+          </ac:spMkLst>
+        </pc:spChg>
+        <pc:spChg chg="mod">
+          <ac:chgData name="Juhani Kauppi" userId="7aea86bdef93781e" providerId="LiveId" clId="{8D97EE2B-F11E-4765-8922-6160B3708960}" dt="2020-04-12T12:19:24.886" v="65" actId="1076"/>
+          <ac:spMkLst>
+            <pc:docMk/>
+            <pc:sldMk cId="4169295361" sldId="261"/>
+            <ac:spMk id="3" creationId="{E3943198-076D-6C40-A154-18E9B788600F}"/>
+          </ac:spMkLst>
+        </pc:spChg>
+        <pc:spChg chg="mod">
+          <ac:chgData name="Juhani Kauppi" userId="7aea86bdef93781e" providerId="LiveId" clId="{8D97EE2B-F11E-4765-8922-6160B3708960}" dt="2020-04-12T12:18:43.566" v="60" actId="1076"/>
+          <ac:spMkLst>
+            <pc:docMk/>
+            <pc:sldMk cId="4169295361" sldId="261"/>
+            <ac:spMk id="4" creationId="{DD103E69-0F3B-784A-ACC4-E2A2435C3EFF}"/>
+          </ac:spMkLst>
+        </pc:spChg>
+        <pc:spChg chg="mod">
+          <ac:chgData name="Juhani Kauppi" userId="7aea86bdef93781e" providerId="LiveId" clId="{8D97EE2B-F11E-4765-8922-6160B3708960}" dt="2020-04-12T12:37:00.074" v="134" actId="108"/>
+          <ac:spMkLst>
+            <pc:docMk/>
+            <pc:sldMk cId="4169295361" sldId="261"/>
+            <ac:spMk id="6" creationId="{6EBDFCCC-58FB-E845-BBA6-0CAD552B9D50}"/>
+          </ac:spMkLst>
+        </pc:spChg>
+        <pc:spChg chg="mod">
+          <ac:chgData name="Juhani Kauppi" userId="7aea86bdef93781e" providerId="LiveId" clId="{8D97EE2B-F11E-4765-8922-6160B3708960}" dt="2020-04-12T12:18:46.526" v="61" actId="1076"/>
+          <ac:spMkLst>
+            <pc:docMk/>
+            <pc:sldMk cId="4169295361" sldId="261"/>
+            <ac:spMk id="7" creationId="{0B68FD0E-0AA6-8843-8BC1-0D16EDFAA799}"/>
+          </ac:spMkLst>
+        </pc:spChg>
+        <pc:spChg chg="mod">
+          <ac:chgData name="Juhani Kauppi" userId="7aea86bdef93781e" providerId="LiveId" clId="{8D97EE2B-F11E-4765-8922-6160B3708960}" dt="2020-04-12T12:17:41.149" v="48" actId="20577"/>
+          <ac:spMkLst>
+            <pc:docMk/>
+            <pc:sldMk cId="4169295361" sldId="261"/>
+            <ac:spMk id="8" creationId="{511A59CC-2010-B94D-AA98-04DDB86D584C}"/>
+          </ac:spMkLst>
+        </pc:spChg>
+        <pc:spChg chg="mod">
+          <ac:chgData name="Juhani Kauppi" userId="7aea86bdef93781e" providerId="LiveId" clId="{8D97EE2B-F11E-4765-8922-6160B3708960}" dt="2020-04-12T12:19:19.575" v="64" actId="1076"/>
+          <ac:spMkLst>
+            <pc:docMk/>
+            <pc:sldMk cId="4169295361" sldId="261"/>
+            <ac:spMk id="12" creationId="{F56BCB6F-5B97-6A41-BACC-2948AC230093}"/>
+          </ac:spMkLst>
+        </pc:spChg>
+        <pc:spChg chg="mod">
+          <ac:chgData name="Juhani Kauppi" userId="7aea86bdef93781e" providerId="LiveId" clId="{8D97EE2B-F11E-4765-8922-6160B3708960}" dt="2020-04-12T12:13:15.009" v="3" actId="20577"/>
+          <ac:spMkLst>
+            <pc:docMk/>
+            <pc:sldMk cId="4169295361" sldId="261"/>
+            <ac:spMk id="14" creationId="{D4A23296-A675-454A-BCFB-3285C13725D2}"/>
+          </ac:spMkLst>
+        </pc:spChg>
+        <pc:spChg chg="mod">
+          <ac:chgData name="Juhani Kauppi" userId="7aea86bdef93781e" providerId="LiveId" clId="{8D97EE2B-F11E-4765-8922-6160B3708960}" dt="2020-04-12T12:37:16.992" v="135" actId="108"/>
+          <ac:spMkLst>
+            <pc:docMk/>
+            <pc:sldMk cId="4169295361" sldId="261"/>
+            <ac:spMk id="16" creationId="{4D8BF517-1E62-D340-A51B-D1245A19E372}"/>
+          </ac:spMkLst>
+        </pc:spChg>
+        <pc:spChg chg="mod">
+          <ac:chgData name="Juhani Kauppi" userId="7aea86bdef93781e" providerId="LiveId" clId="{8D97EE2B-F11E-4765-8922-6160B3708960}" dt="2020-04-12T12:14:22.218" v="4" actId="207"/>
+          <ac:spMkLst>
+            <pc:docMk/>
+            <pc:sldMk cId="4169295361" sldId="261"/>
+            <ac:spMk id="25" creationId="{EE80DA3B-80FB-B648-8E25-D1D8B86D294E}"/>
+          </ac:spMkLst>
+        </pc:spChg>
+        <pc:spChg chg="mod">
+          <ac:chgData name="Juhani Kauppi" userId="7aea86bdef93781e" providerId="LiveId" clId="{8D97EE2B-F11E-4765-8922-6160B3708960}" dt="2020-04-12T12:19:34.725" v="66" actId="1076"/>
+          <ac:spMkLst>
+            <pc:docMk/>
+            <pc:sldMk cId="4169295361" sldId="261"/>
+            <ac:spMk id="27" creationId="{9ED8B63F-D8A9-4B44-9301-BD419E1F2125}"/>
+          </ac:spMkLst>
+        </pc:spChg>
+        <pc:spChg chg="mod">
+          <ac:chgData name="Juhani Kauppi" userId="7aea86bdef93781e" providerId="LiveId" clId="{8D97EE2B-F11E-4765-8922-6160B3708960}" dt="2020-04-12T12:36:14.083" v="132" actId="108"/>
+          <ac:spMkLst>
+            <pc:docMk/>
+            <pc:sldMk cId="4169295361" sldId="261"/>
+            <ac:spMk id="29" creationId="{51C7F087-42A4-914A-A1BC-7DB73BB0C853}"/>
+          </ac:spMkLst>
+        </pc:spChg>
+        <pc:spChg chg="mod">
+          <ac:chgData name="Juhani Kauppi" userId="7aea86bdef93781e" providerId="LiveId" clId="{8D97EE2B-F11E-4765-8922-6160B3708960}" dt="2020-04-12T12:16:08.554" v="22" actId="20577"/>
+          <ac:spMkLst>
+            <pc:docMk/>
+            <pc:sldMk cId="4169295361" sldId="261"/>
+            <ac:spMk id="31" creationId="{E5630E9D-6944-4F41-A950-4B9CFCB3179D}"/>
+          </ac:spMkLst>
+        </pc:spChg>
+        <pc:spChg chg="mod">
+          <ac:chgData name="Juhani Kauppi" userId="7aea86bdef93781e" providerId="LiveId" clId="{8D97EE2B-F11E-4765-8922-6160B3708960}" dt="2020-04-12T12:37:00.074" v="134" actId="108"/>
+          <ac:spMkLst>
+            <pc:docMk/>
+            <pc:sldMk cId="4169295361" sldId="261"/>
+            <ac:spMk id="33" creationId="{0F1D1239-9ACC-8044-B95E-C5E34DAAFBA6}"/>
+          </ac:spMkLst>
+        </pc:spChg>
+        <pc:spChg chg="add mod">
+          <ac:chgData name="Juhani Kauppi" userId="7aea86bdef93781e" providerId="LiveId" clId="{8D97EE2B-F11E-4765-8922-6160B3708960}" dt="2020-04-12T12:17:53.661" v="51" actId="20577"/>
+          <ac:spMkLst>
+            <pc:docMk/>
+            <pc:sldMk cId="4169295361" sldId="261"/>
+            <ac:spMk id="59" creationId="{88522843-F045-40F4-BF53-4ED6894AABF5}"/>
+          </ac:spMkLst>
+        </pc:spChg>
+        <pc:spChg chg="add mod">
+          <ac:chgData name="Juhani Kauppi" userId="7aea86bdef93781e" providerId="LiveId" clId="{8D97EE2B-F11E-4765-8922-6160B3708960}" dt="2020-04-12T12:23:04.539" v="78" actId="20577"/>
+          <ac:spMkLst>
+            <pc:docMk/>
+            <pc:sldMk cId="4169295361" sldId="261"/>
+            <ac:spMk id="89" creationId="{55A3B038-F168-4E9E-BB2E-19A6DC59EDE1}"/>
+          </ac:spMkLst>
+        </pc:spChg>
+        <pc:spChg chg="add mod">
+          <ac:chgData name="Juhani Kauppi" userId="7aea86bdef93781e" providerId="LiveId" clId="{8D97EE2B-F11E-4765-8922-6160B3708960}" dt="2020-04-12T12:37:33.718" v="139" actId="404"/>
+          <ac:spMkLst>
+            <pc:docMk/>
+            <pc:sldMk cId="4169295361" sldId="261"/>
+            <ac:spMk id="90" creationId="{F86DDE48-70B8-4ED7-B05E-8545A84E8D34}"/>
+          </ac:spMkLst>
+        </pc:spChg>
+        <pc:spChg chg="add del">
+          <ac:chgData name="Juhani Kauppi" userId="7aea86bdef93781e" providerId="LiveId" clId="{8D97EE2B-F11E-4765-8922-6160B3708960}" dt="2020-04-12T12:23:12.324" v="81" actId="478"/>
+          <ac:spMkLst>
+            <pc:docMk/>
+            <pc:sldMk cId="4169295361" sldId="261"/>
+            <ac:spMk id="92" creationId="{675574EF-5C50-44D9-A7D7-D7F7D504E286}"/>
+          </ac:spMkLst>
+        </pc:spChg>
+        <pc:spChg chg="mod">
+          <ac:chgData name="Juhani Kauppi" userId="7aea86bdef93781e" providerId="LiveId" clId="{8D97EE2B-F11E-4765-8922-6160B3708960}" dt="2020-04-12T12:19:13.071" v="63" actId="1076"/>
+          <ac:spMkLst>
+            <pc:docMk/>
+            <pc:sldMk cId="4169295361" sldId="261"/>
+            <ac:spMk id="105" creationId="{9A11DAEA-6517-0A42-BEB4-F5396566CFE5}"/>
+          </ac:spMkLst>
+        </pc:spChg>
+        <pc:spChg chg="mod">
+          <ac:chgData name="Juhani Kauppi" userId="7aea86bdef93781e" providerId="LiveId" clId="{8D97EE2B-F11E-4765-8922-6160B3708960}" dt="2020-04-12T12:36:26.416" v="133" actId="108"/>
+          <ac:spMkLst>
+            <pc:docMk/>
+            <pc:sldMk cId="4169295361" sldId="261"/>
+            <ac:spMk id="107" creationId="{7C5403E1-B0D8-ED44-B21B-91CF056326CC}"/>
+          </ac:spMkLst>
+        </pc:spChg>
+        <pc:spChg chg="mod">
+          <ac:chgData name="Juhani Kauppi" userId="7aea86bdef93781e" providerId="LiveId" clId="{8D97EE2B-F11E-4765-8922-6160B3708960}" dt="2020-04-12T12:15:19.787" v="11" actId="20577"/>
+          <ac:spMkLst>
+            <pc:docMk/>
+            <pc:sldMk cId="4169295361" sldId="261"/>
+            <ac:spMk id="129" creationId="{A0176472-59B9-7141-94EC-705C340CCA30}"/>
+          </ac:spMkLst>
+        </pc:spChg>
+        <pc:cxnChg chg="mod">
+          <ac:chgData name="Juhani Kauppi" userId="7aea86bdef93781e" providerId="LiveId" clId="{8D97EE2B-F11E-4765-8922-6160B3708960}" dt="2020-04-12T12:18:51.825" v="62" actId="14100"/>
+          <ac:cxnSpMkLst>
+            <pc:docMk/>
+            <pc:sldMk cId="4169295361" sldId="261"/>
+            <ac:cxnSpMk id="9" creationId="{D2768F06-D620-8E4E-BA6B-4F14CC815F3E}"/>
+          </ac:cxnSpMkLst>
+        </pc:cxnChg>
+        <pc:cxnChg chg="mod">
+          <ac:chgData name="Juhani Kauppi" userId="7aea86bdef93781e" providerId="LiveId" clId="{8D97EE2B-F11E-4765-8922-6160B3708960}" dt="2020-04-12T12:19:43.054" v="68" actId="1076"/>
+          <ac:cxnSpMkLst>
+            <pc:docMk/>
+            <pc:sldMk cId="4169295361" sldId="261"/>
+            <ac:cxnSpMk id="10" creationId="{1B4F6596-F612-0C4A-9EC3-1E5C7ACCF0E4}"/>
+          </ac:cxnSpMkLst>
+        </pc:cxnChg>
+        <pc:cxnChg chg="mod">
+          <ac:chgData name="Juhani Kauppi" userId="7aea86bdef93781e" providerId="LiveId" clId="{8D97EE2B-F11E-4765-8922-6160B3708960}" dt="2020-04-12T12:18:46.526" v="61" actId="1076"/>
+          <ac:cxnSpMkLst>
+            <pc:docMk/>
+            <pc:sldMk cId="4169295361" sldId="261"/>
+            <ac:cxnSpMk id="13" creationId="{D204E305-4A9D-F14E-B89C-FD2B5D8C8786}"/>
+          </ac:cxnSpMkLst>
+        </pc:cxnChg>
+        <pc:cxnChg chg="mod">
+          <ac:chgData name="Juhani Kauppi" userId="7aea86bdef93781e" providerId="LiveId" clId="{8D97EE2B-F11E-4765-8922-6160B3708960}" dt="2020-04-12T12:32:51.749" v="129" actId="14100"/>
+          <ac:cxnSpMkLst>
+            <pc:docMk/>
+            <pc:sldMk cId="4169295361" sldId="261"/>
+            <ac:cxnSpMk id="17" creationId="{1CE8C452-1CCE-EC41-A88B-EEAEB113CFC3}"/>
+          </ac:cxnSpMkLst>
+        </pc:cxnChg>
+        <pc:cxnChg chg="del mod">
+          <ac:chgData name="Juhani Kauppi" userId="7aea86bdef93781e" providerId="LiveId" clId="{8D97EE2B-F11E-4765-8922-6160B3708960}" dt="2020-04-12T12:16:51.825" v="29" actId="478"/>
+          <ac:cxnSpMkLst>
+            <pc:docMk/>
+            <pc:sldMk cId="4169295361" sldId="261"/>
+            <ac:cxnSpMk id="35" creationId="{DE696DA4-B93F-C146-BAA8-25F5298E749A}"/>
+          </ac:cxnSpMkLst>
+        </pc:cxnChg>
+        <pc:cxnChg chg="mod">
+          <ac:chgData name="Juhani Kauppi" userId="7aea86bdef93781e" providerId="LiveId" clId="{8D97EE2B-F11E-4765-8922-6160B3708960}" dt="2020-04-12T12:19:34.725" v="66" actId="1076"/>
+          <ac:cxnSpMkLst>
+            <pc:docMk/>
+            <pc:sldMk cId="4169295361" sldId="261"/>
+            <ac:cxnSpMk id="39" creationId="{B483DE6E-1688-5340-B539-3CA483E628D0}"/>
+          </ac:cxnSpMkLst>
+        </pc:cxnChg>
+        <pc:cxnChg chg="mod">
+          <ac:chgData name="Juhani Kauppi" userId="7aea86bdef93781e" providerId="LiveId" clId="{8D97EE2B-F11E-4765-8922-6160B3708960}" dt="2020-04-12T12:18:36.375" v="59" actId="14100"/>
+          <ac:cxnSpMkLst>
+            <pc:docMk/>
+            <pc:sldMk cId="4169295361" sldId="261"/>
+            <ac:cxnSpMk id="41" creationId="{2EFE2802-9A0A-E34D-8698-102AB4703205}"/>
+          </ac:cxnSpMkLst>
+        </pc:cxnChg>
+        <pc:cxnChg chg="mod">
+          <ac:chgData name="Juhani Kauppi" userId="7aea86bdef93781e" providerId="LiveId" clId="{8D97EE2B-F11E-4765-8922-6160B3708960}" dt="2020-04-12T12:19:13.071" v="63" actId="1076"/>
+          <ac:cxnSpMkLst>
+            <pc:docMk/>
+            <pc:sldMk cId="4169295361" sldId="261"/>
+            <ac:cxnSpMk id="43" creationId="{8852C117-7F84-504E-9BC4-0623365E32C4}"/>
+          </ac:cxnSpMkLst>
+        </pc:cxnChg>
+        <pc:cxnChg chg="mod">
+          <ac:chgData name="Juhani Kauppi" userId="7aea86bdef93781e" providerId="LiveId" clId="{8D97EE2B-F11E-4765-8922-6160B3708960}" dt="2020-04-12T12:18:32.382" v="58" actId="1076"/>
+          <ac:cxnSpMkLst>
+            <pc:docMk/>
+            <pc:sldMk cId="4169295361" sldId="261"/>
+            <ac:cxnSpMk id="56" creationId="{7883714A-D202-A64A-8470-8FEA086BA84C}"/>
+          </ac:cxnSpMkLst>
+        </pc:cxnChg>
+        <pc:cxnChg chg="del mod">
+          <ac:chgData name="Juhani Kauppi" userId="7aea86bdef93781e" providerId="LiveId" clId="{8D97EE2B-F11E-4765-8922-6160B3708960}" dt="2020-04-12T12:14:50.108" v="5" actId="478"/>
+          <ac:cxnSpMkLst>
+            <pc:docMk/>
+            <pc:sldMk cId="4169295361" sldId="261"/>
+            <ac:cxnSpMk id="58" creationId="{80E44376-D502-C74C-8CA7-353B4D5061E9}"/>
+          </ac:cxnSpMkLst>
+        </pc:cxnChg>
+        <pc:cxnChg chg="del mod">
+          <ac:chgData name="Juhani Kauppi" userId="7aea86bdef93781e" providerId="LiveId" clId="{8D97EE2B-F11E-4765-8922-6160B3708960}" dt="2020-04-12T12:15:38.597" v="17" actId="478"/>
+          <ac:cxnSpMkLst>
+            <pc:docMk/>
+            <pc:sldMk cId="4169295361" sldId="261"/>
+            <ac:cxnSpMk id="60" creationId="{78908099-422D-0A49-B4F4-E88963FD8E6E}"/>
+          </ac:cxnSpMkLst>
+        </pc:cxnChg>
+        <pc:cxnChg chg="add mod">
+          <ac:chgData name="Juhani Kauppi" userId="7aea86bdef93781e" providerId="LiveId" clId="{8D97EE2B-F11E-4765-8922-6160B3708960}" dt="2020-04-12T12:31:08.976" v="113" actId="14100"/>
+          <ac:cxnSpMkLst>
+            <pc:docMk/>
+            <pc:sldMk cId="4169295361" sldId="261"/>
+            <ac:cxnSpMk id="61" creationId="{AD82777F-872D-4B14-A85C-3A429863C4CF}"/>
+          </ac:cxnSpMkLst>
+        </pc:cxnChg>
+        <pc:cxnChg chg="mod">
+          <ac:chgData name="Juhani Kauppi" userId="7aea86bdef93781e" providerId="LiveId" clId="{8D97EE2B-F11E-4765-8922-6160B3708960}" dt="2020-04-12T12:19:34.725" v="66" actId="1076"/>
+          <ac:cxnSpMkLst>
+            <pc:docMk/>
+            <pc:sldMk cId="4169295361" sldId="261"/>
+            <ac:cxnSpMk id="62" creationId="{35BC9E26-DD9E-1B4A-A82C-5A344AF1AEED}"/>
+          </ac:cxnSpMkLst>
+        </pc:cxnChg>
+        <pc:cxnChg chg="add mod">
+          <ac:chgData name="Juhani Kauppi" userId="7aea86bdef93781e" providerId="LiveId" clId="{8D97EE2B-F11E-4765-8922-6160B3708960}" dt="2020-04-12T12:18:04.630" v="55" actId="14100"/>
+          <ac:cxnSpMkLst>
+            <pc:docMk/>
+            <pc:sldMk cId="4169295361" sldId="261"/>
+            <ac:cxnSpMk id="63" creationId="{FF970E6E-67C5-4A20-ADC9-78BD66488812}"/>
+          </ac:cxnSpMkLst>
+        </pc:cxnChg>
+        <pc:cxnChg chg="mod">
+          <ac:chgData name="Juhani Kauppi" userId="7aea86bdef93781e" providerId="LiveId" clId="{8D97EE2B-F11E-4765-8922-6160B3708960}" dt="2020-04-12T12:19:43.054" v="68" actId="1076"/>
+          <ac:cxnSpMkLst>
+            <pc:docMk/>
+            <pc:sldMk cId="4169295361" sldId="261"/>
+            <ac:cxnSpMk id="78" creationId="{D115C67D-44C7-9A48-80F7-81C2995A0B5E}"/>
+          </ac:cxnSpMkLst>
+        </pc:cxnChg>
+        <pc:cxnChg chg="mod">
+          <ac:chgData name="Juhani Kauppi" userId="7aea86bdef93781e" providerId="LiveId" clId="{8D97EE2B-F11E-4765-8922-6160B3708960}" dt="2020-04-12T12:19:37.590" v="67" actId="1076"/>
+          <ac:cxnSpMkLst>
+            <pc:docMk/>
+            <pc:sldMk cId="4169295361" sldId="261"/>
+            <ac:cxnSpMk id="80" creationId="{CA280E45-3E1D-834E-8B0C-961C9877D030}"/>
+          </ac:cxnSpMkLst>
+        </pc:cxnChg>
+        <pc:cxnChg chg="mod">
+          <ac:chgData name="Juhani Kauppi" userId="7aea86bdef93781e" providerId="LiveId" clId="{8D97EE2B-F11E-4765-8922-6160B3708960}" dt="2020-04-12T12:18:43.566" v="60" actId="1076"/>
+          <ac:cxnSpMkLst>
+            <pc:docMk/>
+            <pc:sldMk cId="4169295361" sldId="261"/>
+            <ac:cxnSpMk id="91" creationId="{A9531169-6F43-AA4E-90F5-64F7C20C2205}"/>
+          </ac:cxnSpMkLst>
+        </pc:cxnChg>
+        <pc:cxnChg chg="add mod">
+          <ac:chgData name="Juhani Kauppi" userId="7aea86bdef93781e" providerId="LiveId" clId="{8D97EE2B-F11E-4765-8922-6160B3708960}" dt="2020-04-12T12:24:07.181" v="92" actId="14100"/>
+          <ac:cxnSpMkLst>
+            <pc:docMk/>
+            <pc:sldMk cId="4169295361" sldId="261"/>
+            <ac:cxnSpMk id="93" creationId="{40D25137-000B-49F0-83A4-B286648CC6B0}"/>
+          </ac:cxnSpMkLst>
+        </pc:cxnChg>
+        <pc:cxnChg chg="add del mod">
+          <ac:chgData name="Juhani Kauppi" userId="7aea86bdef93781e" providerId="LiveId" clId="{8D97EE2B-F11E-4765-8922-6160B3708960}" dt="2020-04-12T12:34:16.317" v="131" actId="478"/>
+          <ac:cxnSpMkLst>
+            <pc:docMk/>
+            <pc:sldMk cId="4169295361" sldId="261"/>
+            <ac:cxnSpMk id="94" creationId="{16FB3E99-FB2D-48D6-AA1C-19EBC8A5C305}"/>
+          </ac:cxnSpMkLst>
+        </pc:cxnChg>
+        <pc:cxnChg chg="add mod">
+          <ac:chgData name="Juhani Kauppi" userId="7aea86bdef93781e" providerId="LiveId" clId="{8D97EE2B-F11E-4765-8922-6160B3708960}" dt="2020-04-12T12:24:25.121" v="95" actId="14100"/>
+          <ac:cxnSpMkLst>
+            <pc:docMk/>
+            <pc:sldMk cId="4169295361" sldId="261"/>
+            <ac:cxnSpMk id="95" creationId="{4DDB7F44-670A-4BA4-B089-105D96ABB025}"/>
+          </ac:cxnSpMkLst>
+        </pc:cxnChg>
+        <pc:cxnChg chg="add del mod">
+          <ac:chgData name="Juhani Kauppi" userId="7aea86bdef93781e" providerId="LiveId" clId="{8D97EE2B-F11E-4765-8922-6160B3708960}" dt="2020-04-12T12:26:42.307" v="111" actId="478"/>
+          <ac:cxnSpMkLst>
+            <pc:docMk/>
+            <pc:sldMk cId="4169295361" sldId="261"/>
+            <ac:cxnSpMk id="96" creationId="{E245A437-B8B7-4A2B-B934-622C333503DB}"/>
+          </ac:cxnSpMkLst>
+        </pc:cxnChg>
+        <pc:cxnChg chg="add mod">
+          <ac:chgData name="Juhani Kauppi" userId="7aea86bdef93781e" providerId="LiveId" clId="{8D97EE2B-F11E-4765-8922-6160B3708960}" dt="2020-04-12T12:26:10.525" v="110" actId="14100"/>
+          <ac:cxnSpMkLst>
+            <pc:docMk/>
+            <pc:sldMk cId="4169295361" sldId="261"/>
+            <ac:cxnSpMk id="97" creationId="{00359345-4C55-45DF-919D-100FDC767914}"/>
+          </ac:cxnSpMkLst>
+        </pc:cxnChg>
+        <pc:cxnChg chg="add mod">
+          <ac:chgData name="Juhani Kauppi" userId="7aea86bdef93781e" providerId="LiveId" clId="{8D97EE2B-F11E-4765-8922-6160B3708960}" dt="2020-04-12T12:37:48.882" v="140" actId="14100"/>
+          <ac:cxnSpMkLst>
+            <pc:docMk/>
+            <pc:sldMk cId="4169295361" sldId="261"/>
+            <ac:cxnSpMk id="98" creationId="{7DA61426-FCF5-4378-BF88-E1ABD3F09492}"/>
+          </ac:cxnSpMkLst>
+        </pc:cxnChg>
+        <pc:cxnChg chg="mod">
+          <ac:chgData name="Juhani Kauppi" userId="7aea86bdef93781e" providerId="LiveId" clId="{8D97EE2B-F11E-4765-8922-6160B3708960}" dt="2020-04-12T12:19:19.575" v="64" actId="1076"/>
+          <ac:cxnSpMkLst>
+            <pc:docMk/>
+            <pc:sldMk cId="4169295361" sldId="261"/>
+            <ac:cxnSpMk id="109" creationId="{3225C2F2-B3B4-7840-ACF2-E1DA3FC4AA48}"/>
+          </ac:cxnSpMkLst>
+        </pc:cxnChg>
+        <pc:cxnChg chg="mod">
+          <ac:chgData name="Juhani Kauppi" userId="7aea86bdef93781e" providerId="LiveId" clId="{8D97EE2B-F11E-4765-8922-6160B3708960}" dt="2020-04-12T12:17:04.176" v="31" actId="14100"/>
+          <ac:cxnSpMkLst>
+            <pc:docMk/>
+            <pc:sldMk cId="4169295361" sldId="261"/>
+            <ac:cxnSpMk id="111" creationId="{AB53BCAE-B8E8-0F4E-96AC-45335F420C82}"/>
+          </ac:cxnSpMkLst>
+        </pc:cxnChg>
+        <pc:cxnChg chg="mod">
+          <ac:chgData name="Juhani Kauppi" userId="7aea86bdef93781e" providerId="LiveId" clId="{8D97EE2B-F11E-4765-8922-6160B3708960}" dt="2020-04-12T12:15:08.543" v="9" actId="14100"/>
+          <ac:cxnSpMkLst>
+            <pc:docMk/>
+            <pc:sldMk cId="4169295361" sldId="261"/>
+            <ac:cxnSpMk id="131" creationId="{E1591F38-446B-144A-9E08-CAA95183959E}"/>
+          </ac:cxnSpMkLst>
+        </pc:cxnChg>
+        <pc:cxnChg chg="mod">
+          <ac:chgData name="Juhani Kauppi" userId="7aea86bdef93781e" providerId="LiveId" clId="{8D97EE2B-F11E-4765-8922-6160B3708960}" dt="2020-04-12T12:19:24.886" v="65" actId="1076"/>
+          <ac:cxnSpMkLst>
+            <pc:docMk/>
+            <pc:sldMk cId="4169295361" sldId="261"/>
+            <ac:cxnSpMk id="133" creationId="{22B101A6-F3B8-1C46-A2CF-85AD1D793F45}"/>
+          </ac:cxnSpMkLst>
+        </pc:cxnChg>
+      </pc:sldChg>
+    </pc:docChg>
+  </pc:docChgLst>
   <pc:docChgLst>
     <pc:chgData name="Juhani Kauppi" userId="7aea86bdef93781e" providerId="LiveId" clId="{46D00645-CA80-8E44-B644-4BC9157620D5}"/>
     <pc:docChg chg="undo custSel addSld modSld">
@@ -998,7 +1407,7 @@
           <a:p>
             <a:fld id="{50376B91-E573-EC43-BCA1-D45CCC093861}" type="datetimeFigureOut">
               <a:rPr lang="en-FI" smtClean="0"/>
-              <a:t>12.3.2020</a:t>
+              <a:t>04/12/2020</a:t>
             </a:fld>
             <a:endParaRPr lang="en-FI"/>
           </a:p>
@@ -1198,7 +1607,7 @@
           <a:p>
             <a:fld id="{50376B91-E573-EC43-BCA1-D45CCC093861}" type="datetimeFigureOut">
               <a:rPr lang="en-FI" smtClean="0"/>
-              <a:t>12.3.2020</a:t>
+              <a:t>04/12/2020</a:t>
             </a:fld>
             <a:endParaRPr lang="en-FI"/>
           </a:p>
@@ -1408,7 +1817,7 @@
           <a:p>
             <a:fld id="{50376B91-E573-EC43-BCA1-D45CCC093861}" type="datetimeFigureOut">
               <a:rPr lang="en-FI" smtClean="0"/>
-              <a:t>12.3.2020</a:t>
+              <a:t>04/12/2020</a:t>
             </a:fld>
             <a:endParaRPr lang="en-FI"/>
           </a:p>
@@ -1608,7 +2017,7 @@
           <a:p>
             <a:fld id="{50376B91-E573-EC43-BCA1-D45CCC093861}" type="datetimeFigureOut">
               <a:rPr lang="en-FI" smtClean="0"/>
-              <a:t>12.3.2020</a:t>
+              <a:t>04/12/2020</a:t>
             </a:fld>
             <a:endParaRPr lang="en-FI"/>
           </a:p>
@@ -1884,7 +2293,7 @@
           <a:p>
             <a:fld id="{50376B91-E573-EC43-BCA1-D45CCC093861}" type="datetimeFigureOut">
               <a:rPr lang="en-FI" smtClean="0"/>
-              <a:t>12.3.2020</a:t>
+              <a:t>04/12/2020</a:t>
             </a:fld>
             <a:endParaRPr lang="en-FI"/>
           </a:p>
@@ -2152,7 +2561,7 @@
           <a:p>
             <a:fld id="{50376B91-E573-EC43-BCA1-D45CCC093861}" type="datetimeFigureOut">
               <a:rPr lang="en-FI" smtClean="0"/>
-              <a:t>12.3.2020</a:t>
+              <a:t>04/12/2020</a:t>
             </a:fld>
             <a:endParaRPr lang="en-FI"/>
           </a:p>
@@ -2567,7 +2976,7 @@
           <a:p>
             <a:fld id="{50376B91-E573-EC43-BCA1-D45CCC093861}" type="datetimeFigureOut">
               <a:rPr lang="en-FI" smtClean="0"/>
-              <a:t>12.3.2020</a:t>
+              <a:t>04/12/2020</a:t>
             </a:fld>
             <a:endParaRPr lang="en-FI"/>
           </a:p>
@@ -2709,7 +3118,7 @@
           <a:p>
             <a:fld id="{50376B91-E573-EC43-BCA1-D45CCC093861}" type="datetimeFigureOut">
               <a:rPr lang="en-FI" smtClean="0"/>
-              <a:t>12.3.2020</a:t>
+              <a:t>04/12/2020</a:t>
             </a:fld>
             <a:endParaRPr lang="en-FI"/>
           </a:p>
@@ -2822,7 +3231,7 @@
           <a:p>
             <a:fld id="{50376B91-E573-EC43-BCA1-D45CCC093861}" type="datetimeFigureOut">
               <a:rPr lang="en-FI" smtClean="0"/>
-              <a:t>12.3.2020</a:t>
+              <a:t>04/12/2020</a:t>
             </a:fld>
             <a:endParaRPr lang="en-FI"/>
           </a:p>
@@ -3135,7 +3544,7 @@
           <a:p>
             <a:fld id="{50376B91-E573-EC43-BCA1-D45CCC093861}" type="datetimeFigureOut">
               <a:rPr lang="en-FI" smtClean="0"/>
-              <a:t>12.3.2020</a:t>
+              <a:t>04/12/2020</a:t>
             </a:fld>
             <a:endParaRPr lang="en-FI"/>
           </a:p>
@@ -3424,7 +3833,7 @@
           <a:p>
             <a:fld id="{50376B91-E573-EC43-BCA1-D45CCC093861}" type="datetimeFigureOut">
               <a:rPr lang="en-FI" smtClean="0"/>
-              <a:t>12.3.2020</a:t>
+              <a:t>04/12/2020</a:t>
             </a:fld>
             <a:endParaRPr lang="en-FI"/>
           </a:p>
@@ -3667,7 +4076,7 @@
           <a:p>
             <a:fld id="{50376B91-E573-EC43-BCA1-D45CCC093861}" type="datetimeFigureOut">
               <a:rPr lang="en-FI" smtClean="0"/>
-              <a:t>12.3.2020</a:t>
+              <a:t>04/12/2020</a:t>
             </a:fld>
             <a:endParaRPr lang="en-FI"/>
           </a:p>
@@ -9557,8 +9966,8 @@
           </a:fontRef>
         </p:style>
       </p:cxnSp>
-      <mc:AlternateContent xmlns:mc="http://schemas.openxmlformats.org/markup-compatibility/2006">
-        <mc:Choice xmlns:p14="http://schemas.microsoft.com/office/powerpoint/2010/main" Requires="p14">
+      <mc:AlternateContent xmlns:mc="http://schemas.openxmlformats.org/markup-compatibility/2006" xmlns:p14="http://schemas.microsoft.com/office/powerpoint/2010/main">
+        <mc:Choice Requires="p14">
           <p:contentPart p14:bwMode="auto" r:id="rId2">
             <p14:nvContentPartPr>
               <p14:cNvPr id="20" name="Ink 19">
@@ -9577,7 +9986,7 @@
             </p14:xfrm>
           </p:contentPart>
         </mc:Choice>
-        <mc:Fallback>
+        <mc:Fallback xmlns="">
           <p:pic>
             <p:nvPicPr>
               <p:cNvPr id="20" name="Ink 19">
@@ -9608,8 +10017,8 @@
           </p:pic>
         </mc:Fallback>
       </mc:AlternateContent>
-      <mc:AlternateContent xmlns:mc="http://schemas.openxmlformats.org/markup-compatibility/2006">
-        <mc:Choice xmlns:p14="http://schemas.microsoft.com/office/powerpoint/2010/main" Requires="p14">
+      <mc:AlternateContent xmlns:mc="http://schemas.openxmlformats.org/markup-compatibility/2006" xmlns:p14="http://schemas.microsoft.com/office/powerpoint/2010/main">
+        <mc:Choice Requires="p14">
           <p:contentPart p14:bwMode="auto" r:id="rId4">
             <p14:nvContentPartPr>
               <p14:cNvPr id="21" name="Ink 20">
@@ -9628,7 +10037,7 @@
             </p14:xfrm>
           </p:contentPart>
         </mc:Choice>
-        <mc:Fallback>
+        <mc:Fallback xmlns="">
           <p:pic>
             <p:nvPicPr>
               <p:cNvPr id="21" name="Ink 20">
@@ -9659,8 +10068,8 @@
           </p:pic>
         </mc:Fallback>
       </mc:AlternateContent>
-      <mc:AlternateContent xmlns:mc="http://schemas.openxmlformats.org/markup-compatibility/2006">
-        <mc:Choice xmlns:p14="http://schemas.microsoft.com/office/powerpoint/2010/main" Requires="p14">
+      <mc:AlternateContent xmlns:mc="http://schemas.openxmlformats.org/markup-compatibility/2006" xmlns:p14="http://schemas.microsoft.com/office/powerpoint/2010/main">
+        <mc:Choice Requires="p14">
           <p:contentPart p14:bwMode="auto" r:id="rId6">
             <p14:nvContentPartPr>
               <p14:cNvPr id="42" name="Ink 41">
@@ -9679,7 +10088,7 @@
             </p14:xfrm>
           </p:contentPart>
         </mc:Choice>
-        <mc:Fallback>
+        <mc:Fallback xmlns="">
           <p:pic>
             <p:nvPicPr>
               <p:cNvPr id="42" name="Ink 41">
@@ -11512,6 +11921,2176 @@
     <p:extLst>
       <p:ext uri="{BB962C8B-B14F-4D97-AF65-F5344CB8AC3E}">
         <p14:creationId xmlns:p14="http://schemas.microsoft.com/office/powerpoint/2010/main" val="3549775100"/>
+      </p:ext>
+    </p:extLst>
+  </p:cSld>
+  <p:clrMapOvr>
+    <a:masterClrMapping/>
+  </p:clrMapOvr>
+</p:sld>
+</file>
+
+<file path=ppt/slides/slide6.xml><?xml version="1.0" encoding="utf-8"?>
+<p:sld xmlns:a="http://schemas.openxmlformats.org/drawingml/2006/main" xmlns:r="http://schemas.openxmlformats.org/officeDocument/2006/relationships" xmlns:p="http://schemas.openxmlformats.org/presentationml/2006/main">
+  <p:cSld>
+    <p:spTree>
+      <p:nvGrpSpPr>
+        <p:cNvPr id="1" name=""/>
+        <p:cNvGrpSpPr/>
+        <p:nvPr/>
+      </p:nvGrpSpPr>
+      <p:grpSpPr>
+        <a:xfrm>
+          <a:off x="0" y="0"/>
+          <a:ext cx="0" cy="0"/>
+          <a:chOff x="0" y="0"/>
+          <a:chExt cx="0" cy="0"/>
+        </a:xfrm>
+      </p:grpSpPr>
+      <p:sp>
+        <p:nvSpPr>
+          <p:cNvPr id="2" name="Title 1">
+            <a:extLst>
+              <a:ext uri="{FF2B5EF4-FFF2-40B4-BE49-F238E27FC236}">
+                <a16:creationId xmlns:a16="http://schemas.microsoft.com/office/drawing/2014/main" id="{9C642A9D-54C3-9D48-B3D4-776EF7C0B35F}"/>
+              </a:ext>
+            </a:extLst>
+          </p:cNvPr>
+          <p:cNvSpPr>
+            <a:spLocks noGrp="1"/>
+          </p:cNvSpPr>
+          <p:nvPr>
+            <p:ph type="title"/>
+          </p:nvPr>
+        </p:nvSpPr>
+        <p:spPr/>
+        <p:txBody>
+          <a:bodyPr/>
+          <a:lstStyle/>
+          <a:p>
+            <a:r>
+              <a:rPr lang="fi-FI" dirty="0"/>
+              <a:t>One </a:t>
+            </a:r>
+            <a:r>
+              <a:rPr lang="fi-FI" dirty="0" err="1"/>
+              <a:t>or</a:t>
+            </a:r>
+            <a:r>
+              <a:rPr lang="fi-FI" dirty="0"/>
+              <a:t> </a:t>
+            </a:r>
+            <a:r>
+              <a:rPr lang="fi-FI" dirty="0" err="1"/>
+              <a:t>two</a:t>
+            </a:r>
+            <a:r>
+              <a:rPr lang="fi-FI" dirty="0"/>
+              <a:t> </a:t>
+            </a:r>
+            <a:r>
+              <a:rPr lang="fi-FI" dirty="0" err="1"/>
+              <a:t>paths</a:t>
+            </a:r>
+            <a:endParaRPr lang="en-FI" dirty="0"/>
+          </a:p>
+        </p:txBody>
+      </p:sp>
+      <p:sp>
+        <p:nvSpPr>
+          <p:cNvPr id="4" name="Oval 3">
+            <a:extLst>
+              <a:ext uri="{FF2B5EF4-FFF2-40B4-BE49-F238E27FC236}">
+                <a16:creationId xmlns:a16="http://schemas.microsoft.com/office/drawing/2014/main" id="{DD103E69-0F3B-784A-ACC4-E2A2435C3EFF}"/>
+              </a:ext>
+            </a:extLst>
+          </p:cNvPr>
+          <p:cNvSpPr/>
+          <p:nvPr/>
+        </p:nvSpPr>
+        <p:spPr>
+          <a:xfrm>
+            <a:off x="6058356" y="5734090"/>
+            <a:ext cx="604761" cy="604761"/>
+          </a:xfrm>
+          <a:prstGeom prst="ellipse">
+            <a:avLst/>
+          </a:prstGeom>
+          <a:solidFill>
+            <a:schemeClr val="accent1">
+              <a:lumMod val="50000"/>
+            </a:schemeClr>
+          </a:solidFill>
+        </p:spPr>
+        <p:style>
+          <a:lnRef idx="2">
+            <a:schemeClr val="accent1">
+              <a:shade val="50000"/>
+            </a:schemeClr>
+          </a:lnRef>
+          <a:fillRef idx="1">
+            <a:schemeClr val="accent1"/>
+          </a:fillRef>
+          <a:effectRef idx="0">
+            <a:schemeClr val="accent1"/>
+          </a:effectRef>
+          <a:fontRef idx="minor">
+            <a:schemeClr val="lt1"/>
+          </a:fontRef>
+        </p:style>
+        <p:txBody>
+          <a:bodyPr rtlCol="0" anchor="ctr"/>
+          <a:lstStyle/>
+          <a:p>
+            <a:pPr algn="ctr"/>
+            <a:r>
+              <a:rPr lang="fi-FI" dirty="0"/>
+              <a:t>12</a:t>
+            </a:r>
+            <a:endParaRPr lang="en-FI" dirty="0"/>
+          </a:p>
+        </p:txBody>
+      </p:sp>
+      <p:sp>
+        <p:nvSpPr>
+          <p:cNvPr id="6" name="Oval 5">
+            <a:extLst>
+              <a:ext uri="{FF2B5EF4-FFF2-40B4-BE49-F238E27FC236}">
+                <a16:creationId xmlns:a16="http://schemas.microsoft.com/office/drawing/2014/main" id="{6EBDFCCC-58FB-E845-BBA6-0CAD552B9D50}"/>
+              </a:ext>
+            </a:extLst>
+          </p:cNvPr>
+          <p:cNvSpPr/>
+          <p:nvPr/>
+        </p:nvSpPr>
+        <p:spPr>
+          <a:xfrm>
+            <a:off x="4768059" y="3561462"/>
+            <a:ext cx="604761" cy="604761"/>
+          </a:xfrm>
+          <a:prstGeom prst="ellipse">
+            <a:avLst/>
+          </a:prstGeom>
+          <a:solidFill>
+            <a:schemeClr val="accent1">
+              <a:lumMod val="50000"/>
+            </a:schemeClr>
+          </a:solidFill>
+        </p:spPr>
+        <p:style>
+          <a:lnRef idx="2">
+            <a:schemeClr val="accent1">
+              <a:shade val="50000"/>
+            </a:schemeClr>
+          </a:lnRef>
+          <a:fillRef idx="1">
+            <a:schemeClr val="accent1"/>
+          </a:fillRef>
+          <a:effectRef idx="0">
+            <a:schemeClr val="accent1"/>
+          </a:effectRef>
+          <a:fontRef idx="minor">
+            <a:schemeClr val="lt1"/>
+          </a:fontRef>
+        </p:style>
+        <p:txBody>
+          <a:bodyPr rtlCol="0" anchor="ctr"/>
+          <a:lstStyle/>
+          <a:p>
+            <a:pPr algn="ctr"/>
+            <a:r>
+              <a:rPr lang="fi-FI"/>
+              <a:t>2</a:t>
+            </a:r>
+            <a:endParaRPr lang="en-FI" dirty="0"/>
+          </a:p>
+        </p:txBody>
+      </p:sp>
+      <p:sp>
+        <p:nvSpPr>
+          <p:cNvPr id="8" name="Oval 7">
+            <a:extLst>
+              <a:ext uri="{FF2B5EF4-FFF2-40B4-BE49-F238E27FC236}">
+                <a16:creationId xmlns:a16="http://schemas.microsoft.com/office/drawing/2014/main" id="{511A59CC-2010-B94D-AA98-04DDB86D584C}"/>
+              </a:ext>
+            </a:extLst>
+          </p:cNvPr>
+          <p:cNvSpPr/>
+          <p:nvPr/>
+        </p:nvSpPr>
+        <p:spPr>
+          <a:xfrm>
+            <a:off x="4378672" y="2257463"/>
+            <a:ext cx="604761" cy="604761"/>
+          </a:xfrm>
+          <a:prstGeom prst="ellipse">
+            <a:avLst/>
+          </a:prstGeom>
+          <a:solidFill>
+            <a:schemeClr val="accent1">
+              <a:lumMod val="50000"/>
+            </a:schemeClr>
+          </a:solidFill>
+        </p:spPr>
+        <p:style>
+          <a:lnRef idx="2">
+            <a:schemeClr val="accent1">
+              <a:shade val="50000"/>
+            </a:schemeClr>
+          </a:lnRef>
+          <a:fillRef idx="1">
+            <a:schemeClr val="accent1"/>
+          </a:fillRef>
+          <a:effectRef idx="0">
+            <a:schemeClr val="accent1"/>
+          </a:effectRef>
+          <a:fontRef idx="minor">
+            <a:schemeClr val="lt1"/>
+          </a:fontRef>
+        </p:style>
+        <p:txBody>
+          <a:bodyPr rtlCol="0" anchor="ctr"/>
+          <a:lstStyle/>
+          <a:p>
+            <a:pPr algn="ctr"/>
+            <a:r>
+              <a:rPr lang="fi-FI" dirty="0"/>
+              <a:t>7</a:t>
+            </a:r>
+            <a:endParaRPr lang="en-FI" dirty="0"/>
+          </a:p>
+        </p:txBody>
+      </p:sp>
+      <p:sp>
+        <p:nvSpPr>
+          <p:cNvPr id="12" name="Oval 11">
+            <a:extLst>
+              <a:ext uri="{FF2B5EF4-FFF2-40B4-BE49-F238E27FC236}">
+                <a16:creationId xmlns:a16="http://schemas.microsoft.com/office/drawing/2014/main" id="{F56BCB6F-5B97-6A41-BACC-2948AC230093}"/>
+              </a:ext>
+            </a:extLst>
+          </p:cNvPr>
+          <p:cNvSpPr/>
+          <p:nvPr/>
+        </p:nvSpPr>
+        <p:spPr>
+          <a:xfrm>
+            <a:off x="7131258" y="2257461"/>
+            <a:ext cx="604761" cy="604761"/>
+          </a:xfrm>
+          <a:prstGeom prst="ellipse">
+            <a:avLst/>
+          </a:prstGeom>
+          <a:solidFill>
+            <a:schemeClr val="accent1">
+              <a:lumMod val="20000"/>
+              <a:lumOff val="80000"/>
+            </a:schemeClr>
+          </a:solidFill>
+        </p:spPr>
+        <p:style>
+          <a:lnRef idx="2">
+            <a:schemeClr val="accent1">
+              <a:shade val="50000"/>
+            </a:schemeClr>
+          </a:lnRef>
+          <a:fillRef idx="1">
+            <a:schemeClr val="accent1"/>
+          </a:fillRef>
+          <a:effectRef idx="0">
+            <a:schemeClr val="accent1"/>
+          </a:effectRef>
+          <a:fontRef idx="minor">
+            <a:schemeClr val="lt1"/>
+          </a:fontRef>
+        </p:style>
+        <p:txBody>
+          <a:bodyPr rtlCol="0" anchor="ctr"/>
+          <a:lstStyle/>
+          <a:p>
+            <a:pPr algn="ctr"/>
+            <a:r>
+              <a:rPr lang="fi-FI" dirty="0"/>
+              <a:t>9</a:t>
+            </a:r>
+            <a:endParaRPr lang="en-FI" dirty="0"/>
+          </a:p>
+        </p:txBody>
+      </p:sp>
+      <p:sp>
+        <p:nvSpPr>
+          <p:cNvPr id="14" name="Oval 13">
+            <a:extLst>
+              <a:ext uri="{FF2B5EF4-FFF2-40B4-BE49-F238E27FC236}">
+                <a16:creationId xmlns:a16="http://schemas.microsoft.com/office/drawing/2014/main" id="{D4A23296-A675-454A-BCFB-3285C13725D2}"/>
+              </a:ext>
+            </a:extLst>
+          </p:cNvPr>
+          <p:cNvSpPr/>
+          <p:nvPr/>
+        </p:nvSpPr>
+        <p:spPr>
+          <a:xfrm>
+            <a:off x="10344680" y="3755273"/>
+            <a:ext cx="604761" cy="604761"/>
+          </a:xfrm>
+          <a:prstGeom prst="ellipse">
+            <a:avLst/>
+          </a:prstGeom>
+          <a:solidFill>
+            <a:srgbClr val="00B050"/>
+          </a:solidFill>
+        </p:spPr>
+        <p:style>
+          <a:lnRef idx="2">
+            <a:schemeClr val="accent1">
+              <a:shade val="50000"/>
+            </a:schemeClr>
+          </a:lnRef>
+          <a:fillRef idx="1">
+            <a:schemeClr val="accent1"/>
+          </a:fillRef>
+          <a:effectRef idx="0">
+            <a:schemeClr val="accent1"/>
+          </a:effectRef>
+          <a:fontRef idx="minor">
+            <a:schemeClr val="lt1"/>
+          </a:fontRef>
+        </p:style>
+        <p:txBody>
+          <a:bodyPr rtlCol="0" anchor="ctr"/>
+          <a:lstStyle/>
+          <a:p>
+            <a:pPr algn="ctr"/>
+            <a:r>
+              <a:rPr lang="fi-FI" dirty="0"/>
+              <a:t>E</a:t>
+            </a:r>
+            <a:endParaRPr lang="en-FI" dirty="0"/>
+          </a:p>
+        </p:txBody>
+      </p:sp>
+      <p:sp>
+        <p:nvSpPr>
+          <p:cNvPr id="16" name="Oval 15">
+            <a:extLst>
+              <a:ext uri="{FF2B5EF4-FFF2-40B4-BE49-F238E27FC236}">
+                <a16:creationId xmlns:a16="http://schemas.microsoft.com/office/drawing/2014/main" id="{4D8BF517-1E62-D340-A51B-D1245A19E372}"/>
+              </a:ext>
+            </a:extLst>
+          </p:cNvPr>
+          <p:cNvSpPr/>
+          <p:nvPr/>
+        </p:nvSpPr>
+        <p:spPr>
+          <a:xfrm>
+            <a:off x="7495621" y="5888114"/>
+            <a:ext cx="604761" cy="604761"/>
+          </a:xfrm>
+          <a:prstGeom prst="ellipse">
+            <a:avLst/>
+          </a:prstGeom>
+          <a:solidFill>
+            <a:schemeClr val="accent1">
+              <a:lumMod val="50000"/>
+            </a:schemeClr>
+          </a:solidFill>
+        </p:spPr>
+        <p:style>
+          <a:lnRef idx="2">
+            <a:schemeClr val="accent1">
+              <a:shade val="50000"/>
+            </a:schemeClr>
+          </a:lnRef>
+          <a:fillRef idx="1">
+            <a:schemeClr val="accent1"/>
+          </a:fillRef>
+          <a:effectRef idx="0">
+            <a:schemeClr val="accent1"/>
+          </a:effectRef>
+          <a:fontRef idx="minor">
+            <a:schemeClr val="lt1"/>
+          </a:fontRef>
+        </p:style>
+        <p:txBody>
+          <a:bodyPr rtlCol="0" anchor="ctr"/>
+          <a:lstStyle/>
+          <a:p>
+            <a:pPr algn="ctr"/>
+            <a:r>
+              <a:rPr lang="fi-FI"/>
+              <a:t>13</a:t>
+            </a:r>
+            <a:endParaRPr lang="en-FI" dirty="0"/>
+          </a:p>
+        </p:txBody>
+      </p:sp>
+      <p:cxnSp>
+        <p:nvCxnSpPr>
+          <p:cNvPr id="17" name="Connector: Elbow 16">
+            <a:extLst>
+              <a:ext uri="{FF2B5EF4-FFF2-40B4-BE49-F238E27FC236}">
+                <a16:creationId xmlns:a16="http://schemas.microsoft.com/office/drawing/2014/main" id="{1CE8C452-1CCE-EC41-A88B-EEAEB113CFC3}"/>
+              </a:ext>
+            </a:extLst>
+          </p:cNvPr>
+          <p:cNvCxnSpPr>
+            <a:cxnSpLocks/>
+            <a:stCxn id="12" idx="4"/>
+            <a:endCxn id="33" idx="0"/>
+          </p:cNvCxnSpPr>
+          <p:nvPr/>
+        </p:nvCxnSpPr>
+        <p:spPr>
+          <a:xfrm rot="5400000">
+            <a:off x="6638096" y="2763989"/>
+            <a:ext cx="697311" cy="893776"/>
+          </a:xfrm>
+          <a:prstGeom prst="bentConnector3">
+            <a:avLst>
+              <a:gd name="adj1" fmla="val 50000"/>
+            </a:avLst>
+          </a:prstGeom>
+          <a:ln>
+            <a:headEnd type="triangle"/>
+            <a:tailEnd type="triangle"/>
+          </a:ln>
+        </p:spPr>
+        <p:style>
+          <a:lnRef idx="1">
+            <a:schemeClr val="accent1"/>
+          </a:lnRef>
+          <a:fillRef idx="0">
+            <a:schemeClr val="accent1"/>
+          </a:fillRef>
+          <a:effectRef idx="0">
+            <a:schemeClr val="accent1"/>
+          </a:effectRef>
+          <a:fontRef idx="minor">
+            <a:schemeClr val="tx1"/>
+          </a:fontRef>
+        </p:style>
+      </p:cxnSp>
+      <p:sp>
+        <p:nvSpPr>
+          <p:cNvPr id="25" name="Oval 24">
+            <a:extLst>
+              <a:ext uri="{FF2B5EF4-FFF2-40B4-BE49-F238E27FC236}">
+                <a16:creationId xmlns:a16="http://schemas.microsoft.com/office/drawing/2014/main" id="{EE80DA3B-80FB-B648-8E25-D1D8B86D294E}"/>
+              </a:ext>
+            </a:extLst>
+          </p:cNvPr>
+          <p:cNvSpPr/>
+          <p:nvPr/>
+        </p:nvSpPr>
+        <p:spPr>
+          <a:xfrm>
+            <a:off x="1507283" y="3559533"/>
+            <a:ext cx="604761" cy="604761"/>
+          </a:xfrm>
+          <a:prstGeom prst="ellipse">
+            <a:avLst/>
+          </a:prstGeom>
+          <a:solidFill>
+            <a:srgbClr val="FFC000"/>
+          </a:solidFill>
+        </p:spPr>
+        <p:style>
+          <a:lnRef idx="2">
+            <a:schemeClr val="accent1">
+              <a:shade val="50000"/>
+            </a:schemeClr>
+          </a:lnRef>
+          <a:fillRef idx="1">
+            <a:schemeClr val="accent1"/>
+          </a:fillRef>
+          <a:effectRef idx="0">
+            <a:schemeClr val="accent1"/>
+          </a:effectRef>
+          <a:fontRef idx="minor">
+            <a:schemeClr val="lt1"/>
+          </a:fontRef>
+        </p:style>
+        <p:txBody>
+          <a:bodyPr rtlCol="0" anchor="ctr"/>
+          <a:lstStyle/>
+          <a:p>
+            <a:pPr algn="ctr"/>
+            <a:r>
+              <a:rPr lang="fi-FI" dirty="0"/>
+              <a:t>S</a:t>
+            </a:r>
+            <a:endParaRPr lang="en-FI" dirty="0"/>
+          </a:p>
+        </p:txBody>
+      </p:sp>
+      <p:sp>
+        <p:nvSpPr>
+          <p:cNvPr id="27" name="Oval 26">
+            <a:extLst>
+              <a:ext uri="{FF2B5EF4-FFF2-40B4-BE49-F238E27FC236}">
+                <a16:creationId xmlns:a16="http://schemas.microsoft.com/office/drawing/2014/main" id="{9ED8B63F-D8A9-4B44-9301-BD419E1F2125}"/>
+              </a:ext>
+            </a:extLst>
+          </p:cNvPr>
+          <p:cNvSpPr/>
+          <p:nvPr/>
+        </p:nvSpPr>
+        <p:spPr>
+          <a:xfrm>
+            <a:off x="2888631" y="3563066"/>
+            <a:ext cx="604761" cy="604761"/>
+          </a:xfrm>
+          <a:prstGeom prst="ellipse">
+            <a:avLst/>
+          </a:prstGeom>
+        </p:spPr>
+        <p:style>
+          <a:lnRef idx="2">
+            <a:schemeClr val="accent1">
+              <a:shade val="50000"/>
+            </a:schemeClr>
+          </a:lnRef>
+          <a:fillRef idx="1">
+            <a:schemeClr val="accent1"/>
+          </a:fillRef>
+          <a:effectRef idx="0">
+            <a:schemeClr val="accent1"/>
+          </a:effectRef>
+          <a:fontRef idx="minor">
+            <a:schemeClr val="lt1"/>
+          </a:fontRef>
+        </p:style>
+        <p:txBody>
+          <a:bodyPr rtlCol="0" anchor="ctr"/>
+          <a:lstStyle/>
+          <a:p>
+            <a:pPr algn="ctr"/>
+            <a:r>
+              <a:rPr lang="fi-FI" dirty="0"/>
+              <a:t>1</a:t>
+            </a:r>
+            <a:endParaRPr lang="en-FI" dirty="0"/>
+          </a:p>
+        </p:txBody>
+      </p:sp>
+      <p:sp>
+        <p:nvSpPr>
+          <p:cNvPr id="29" name="Oval 28">
+            <a:extLst>
+              <a:ext uri="{FF2B5EF4-FFF2-40B4-BE49-F238E27FC236}">
+                <a16:creationId xmlns:a16="http://schemas.microsoft.com/office/drawing/2014/main" id="{51C7F087-42A4-914A-A1BC-7DB73BB0C853}"/>
+              </a:ext>
+            </a:extLst>
+          </p:cNvPr>
+          <p:cNvSpPr/>
+          <p:nvPr/>
+        </p:nvSpPr>
+        <p:spPr>
+          <a:xfrm>
+            <a:off x="9667446" y="4624428"/>
+            <a:ext cx="604761" cy="604761"/>
+          </a:xfrm>
+          <a:prstGeom prst="ellipse">
+            <a:avLst/>
+          </a:prstGeom>
+          <a:solidFill>
+            <a:schemeClr val="accent1">
+              <a:lumMod val="20000"/>
+              <a:lumOff val="80000"/>
+            </a:schemeClr>
+          </a:solidFill>
+        </p:spPr>
+        <p:style>
+          <a:lnRef idx="2">
+            <a:schemeClr val="accent1">
+              <a:shade val="50000"/>
+            </a:schemeClr>
+          </a:lnRef>
+          <a:fillRef idx="1">
+            <a:schemeClr val="accent1"/>
+          </a:fillRef>
+          <a:effectRef idx="0">
+            <a:schemeClr val="accent1"/>
+          </a:effectRef>
+          <a:fontRef idx="minor">
+            <a:schemeClr val="lt1"/>
+          </a:fontRef>
+        </p:style>
+        <p:txBody>
+          <a:bodyPr rtlCol="0" anchor="ctr"/>
+          <a:lstStyle/>
+          <a:p>
+            <a:pPr algn="ctr"/>
+            <a:r>
+              <a:rPr lang="fi-FI"/>
+              <a:t>15</a:t>
+            </a:r>
+            <a:endParaRPr lang="en-FI" dirty="0"/>
+          </a:p>
+        </p:txBody>
+      </p:sp>
+      <p:sp>
+        <p:nvSpPr>
+          <p:cNvPr id="31" name="Oval 30">
+            <a:extLst>
+              <a:ext uri="{FF2B5EF4-FFF2-40B4-BE49-F238E27FC236}">
+                <a16:creationId xmlns:a16="http://schemas.microsoft.com/office/drawing/2014/main" id="{E5630E9D-6944-4F41-A950-4B9CFCB3179D}"/>
+              </a:ext>
+            </a:extLst>
+          </p:cNvPr>
+          <p:cNvSpPr/>
+          <p:nvPr/>
+        </p:nvSpPr>
+        <p:spPr>
+          <a:xfrm>
+            <a:off x="3574502" y="4774841"/>
+            <a:ext cx="604761" cy="604761"/>
+          </a:xfrm>
+          <a:prstGeom prst="ellipse">
+            <a:avLst/>
+          </a:prstGeom>
+          <a:solidFill>
+            <a:schemeClr val="accent1">
+              <a:lumMod val="50000"/>
+            </a:schemeClr>
+          </a:solidFill>
+        </p:spPr>
+        <p:style>
+          <a:lnRef idx="2">
+            <a:schemeClr val="accent1">
+              <a:shade val="50000"/>
+            </a:schemeClr>
+          </a:lnRef>
+          <a:fillRef idx="1">
+            <a:schemeClr val="accent1"/>
+          </a:fillRef>
+          <a:effectRef idx="0">
+            <a:schemeClr val="accent1"/>
+          </a:effectRef>
+          <a:fontRef idx="minor">
+            <a:schemeClr val="lt1"/>
+          </a:fontRef>
+        </p:style>
+        <p:txBody>
+          <a:bodyPr rtlCol="0" anchor="ctr"/>
+          <a:lstStyle/>
+          <a:p>
+            <a:pPr algn="ctr"/>
+            <a:r>
+              <a:rPr lang="fi-FI" dirty="0"/>
+              <a:t>10</a:t>
+            </a:r>
+            <a:endParaRPr lang="en-FI" dirty="0"/>
+          </a:p>
+        </p:txBody>
+      </p:sp>
+      <p:sp>
+        <p:nvSpPr>
+          <p:cNvPr id="33" name="Oval 32">
+            <a:extLst>
+              <a:ext uri="{FF2B5EF4-FFF2-40B4-BE49-F238E27FC236}">
+                <a16:creationId xmlns:a16="http://schemas.microsoft.com/office/drawing/2014/main" id="{0F1D1239-9ACC-8044-B95E-C5E34DAAFBA6}"/>
+              </a:ext>
+            </a:extLst>
+          </p:cNvPr>
+          <p:cNvSpPr/>
+          <p:nvPr/>
+        </p:nvSpPr>
+        <p:spPr>
+          <a:xfrm>
+            <a:off x="6237482" y="3559533"/>
+            <a:ext cx="604761" cy="604761"/>
+          </a:xfrm>
+          <a:prstGeom prst="ellipse">
+            <a:avLst/>
+          </a:prstGeom>
+          <a:solidFill>
+            <a:schemeClr val="accent1">
+              <a:lumMod val="50000"/>
+            </a:schemeClr>
+          </a:solidFill>
+        </p:spPr>
+        <p:style>
+          <a:lnRef idx="2">
+            <a:schemeClr val="accent1">
+              <a:shade val="50000"/>
+            </a:schemeClr>
+          </a:lnRef>
+          <a:fillRef idx="1">
+            <a:schemeClr val="accent1"/>
+          </a:fillRef>
+          <a:effectRef idx="0">
+            <a:schemeClr val="accent1"/>
+          </a:effectRef>
+          <a:fontRef idx="minor">
+            <a:schemeClr val="lt1"/>
+          </a:fontRef>
+        </p:style>
+        <p:txBody>
+          <a:bodyPr rtlCol="0" anchor="ctr"/>
+          <a:lstStyle/>
+          <a:p>
+            <a:pPr algn="ctr"/>
+            <a:r>
+              <a:rPr lang="fi-FI" dirty="0"/>
+              <a:t>3</a:t>
+            </a:r>
+            <a:endParaRPr lang="en-FI" dirty="0"/>
+          </a:p>
+        </p:txBody>
+      </p:sp>
+      <p:cxnSp>
+        <p:nvCxnSpPr>
+          <p:cNvPr id="39" name="Connector: Elbow 38">
+            <a:extLst>
+              <a:ext uri="{FF2B5EF4-FFF2-40B4-BE49-F238E27FC236}">
+                <a16:creationId xmlns:a16="http://schemas.microsoft.com/office/drawing/2014/main" id="{B483DE6E-1688-5340-B539-3CA483E628D0}"/>
+              </a:ext>
+            </a:extLst>
+          </p:cNvPr>
+          <p:cNvCxnSpPr>
+            <a:cxnSpLocks/>
+            <a:stCxn id="27" idx="4"/>
+            <a:endCxn id="31" idx="2"/>
+          </p:cNvCxnSpPr>
+          <p:nvPr/>
+        </p:nvCxnSpPr>
+        <p:spPr>
+          <a:xfrm rot="16200000" flipH="1">
+            <a:off x="2928060" y="4430779"/>
+            <a:ext cx="909395" cy="383490"/>
+          </a:xfrm>
+          <a:prstGeom prst="bentConnector2">
+            <a:avLst/>
+          </a:prstGeom>
+          <a:ln>
+            <a:headEnd type="triangle"/>
+            <a:tailEnd type="triangle"/>
+          </a:ln>
+        </p:spPr>
+        <p:style>
+          <a:lnRef idx="1">
+            <a:schemeClr val="accent1"/>
+          </a:lnRef>
+          <a:fillRef idx="0">
+            <a:schemeClr val="accent1"/>
+          </a:fillRef>
+          <a:effectRef idx="0">
+            <a:schemeClr val="accent1"/>
+          </a:effectRef>
+          <a:fontRef idx="minor">
+            <a:schemeClr val="tx1"/>
+          </a:fontRef>
+        </p:style>
+      </p:cxnSp>
+      <p:cxnSp>
+        <p:nvCxnSpPr>
+          <p:cNvPr id="41" name="Connector: Elbow 40">
+            <a:extLst>
+              <a:ext uri="{FF2B5EF4-FFF2-40B4-BE49-F238E27FC236}">
+                <a16:creationId xmlns:a16="http://schemas.microsoft.com/office/drawing/2014/main" id="{2EFE2802-9A0A-E34D-8698-102AB4703205}"/>
+              </a:ext>
+            </a:extLst>
+          </p:cNvPr>
+          <p:cNvCxnSpPr>
+            <a:cxnSpLocks/>
+            <a:stCxn id="107" idx="6"/>
+            <a:endCxn id="29" idx="2"/>
+          </p:cNvCxnSpPr>
+          <p:nvPr/>
+        </p:nvCxnSpPr>
+        <p:spPr>
+          <a:xfrm flipV="1">
+            <a:off x="8990212" y="4926809"/>
+            <a:ext cx="677234" cy="504901"/>
+          </a:xfrm>
+          <a:prstGeom prst="bentConnector3">
+            <a:avLst>
+              <a:gd name="adj1" fmla="val 50000"/>
+            </a:avLst>
+          </a:prstGeom>
+          <a:ln>
+            <a:headEnd type="triangle"/>
+            <a:tailEnd type="triangle"/>
+          </a:ln>
+        </p:spPr>
+        <p:style>
+          <a:lnRef idx="1">
+            <a:schemeClr val="accent1"/>
+          </a:lnRef>
+          <a:fillRef idx="0">
+            <a:schemeClr val="accent1"/>
+          </a:fillRef>
+          <a:effectRef idx="0">
+            <a:schemeClr val="accent1"/>
+          </a:effectRef>
+          <a:fontRef idx="minor">
+            <a:schemeClr val="tx1"/>
+          </a:fontRef>
+        </p:style>
+      </p:cxnSp>
+      <p:cxnSp>
+        <p:nvCxnSpPr>
+          <p:cNvPr id="43" name="Connector: Elbow 42">
+            <a:extLst>
+              <a:ext uri="{FF2B5EF4-FFF2-40B4-BE49-F238E27FC236}">
+                <a16:creationId xmlns:a16="http://schemas.microsoft.com/office/drawing/2014/main" id="{8852C117-7F84-504E-9BC4-0623365E32C4}"/>
+              </a:ext>
+            </a:extLst>
+          </p:cNvPr>
+          <p:cNvCxnSpPr>
+            <a:cxnSpLocks/>
+            <a:stCxn id="8" idx="6"/>
+            <a:endCxn id="105" idx="2"/>
+          </p:cNvCxnSpPr>
+          <p:nvPr/>
+        </p:nvCxnSpPr>
+        <p:spPr>
+          <a:xfrm flipV="1">
+            <a:off x="4983433" y="2559843"/>
+            <a:ext cx="790491" cy="1"/>
+          </a:xfrm>
+          <a:prstGeom prst="bentConnector3">
+            <a:avLst>
+              <a:gd name="adj1" fmla="val 50000"/>
+            </a:avLst>
+          </a:prstGeom>
+          <a:ln>
+            <a:headEnd type="triangle"/>
+            <a:tailEnd type="triangle"/>
+          </a:ln>
+        </p:spPr>
+        <p:style>
+          <a:lnRef idx="1">
+            <a:schemeClr val="accent1"/>
+          </a:lnRef>
+          <a:fillRef idx="0">
+            <a:schemeClr val="accent1"/>
+          </a:fillRef>
+          <a:effectRef idx="0">
+            <a:schemeClr val="accent1"/>
+          </a:effectRef>
+          <a:fontRef idx="minor">
+            <a:schemeClr val="tx1"/>
+          </a:fontRef>
+        </p:style>
+      </p:cxnSp>
+      <p:cxnSp>
+        <p:nvCxnSpPr>
+          <p:cNvPr id="56" name="Connector: Elbow 55">
+            <a:extLst>
+              <a:ext uri="{FF2B5EF4-FFF2-40B4-BE49-F238E27FC236}">
+                <a16:creationId xmlns:a16="http://schemas.microsoft.com/office/drawing/2014/main" id="{7883714A-D202-A64A-8470-8FEA086BA84C}"/>
+              </a:ext>
+            </a:extLst>
+          </p:cNvPr>
+          <p:cNvCxnSpPr>
+            <a:cxnSpLocks/>
+            <a:stCxn id="16" idx="6"/>
+            <a:endCxn id="107" idx="4"/>
+          </p:cNvCxnSpPr>
+          <p:nvPr/>
+        </p:nvCxnSpPr>
+        <p:spPr>
+          <a:xfrm flipV="1">
+            <a:off x="8100382" y="5734090"/>
+            <a:ext cx="587450" cy="456405"/>
+          </a:xfrm>
+          <a:prstGeom prst="bentConnector2">
+            <a:avLst/>
+          </a:prstGeom>
+          <a:ln>
+            <a:headEnd type="triangle"/>
+            <a:tailEnd type="triangle"/>
+          </a:ln>
+        </p:spPr>
+        <p:style>
+          <a:lnRef idx="1">
+            <a:schemeClr val="accent1"/>
+          </a:lnRef>
+          <a:fillRef idx="0">
+            <a:schemeClr val="accent1"/>
+          </a:fillRef>
+          <a:effectRef idx="0">
+            <a:schemeClr val="accent1"/>
+          </a:effectRef>
+          <a:fontRef idx="minor">
+            <a:schemeClr val="tx1"/>
+          </a:fontRef>
+        </p:style>
+      </p:cxnSp>
+      <p:cxnSp>
+        <p:nvCxnSpPr>
+          <p:cNvPr id="62" name="Connector: Elbow 61">
+            <a:extLst>
+              <a:ext uri="{FF2B5EF4-FFF2-40B4-BE49-F238E27FC236}">
+                <a16:creationId xmlns:a16="http://schemas.microsoft.com/office/drawing/2014/main" id="{35BC9E26-DD9E-1B4A-A82C-5A344AF1AEED}"/>
+              </a:ext>
+            </a:extLst>
+          </p:cNvPr>
+          <p:cNvCxnSpPr>
+            <a:cxnSpLocks/>
+            <a:stCxn id="25" idx="6"/>
+            <a:endCxn id="27" idx="2"/>
+          </p:cNvCxnSpPr>
+          <p:nvPr/>
+        </p:nvCxnSpPr>
+        <p:spPr>
+          <a:xfrm>
+            <a:off x="2112044" y="3861914"/>
+            <a:ext cx="776587" cy="3533"/>
+          </a:xfrm>
+          <a:prstGeom prst="bentConnector3">
+            <a:avLst>
+              <a:gd name="adj1" fmla="val 50000"/>
+            </a:avLst>
+          </a:prstGeom>
+          <a:ln>
+            <a:headEnd type="triangle"/>
+            <a:tailEnd type="triangle"/>
+          </a:ln>
+        </p:spPr>
+        <p:style>
+          <a:lnRef idx="1">
+            <a:schemeClr val="accent1"/>
+          </a:lnRef>
+          <a:fillRef idx="0">
+            <a:schemeClr val="accent1"/>
+          </a:fillRef>
+          <a:effectRef idx="0">
+            <a:schemeClr val="accent1"/>
+          </a:effectRef>
+          <a:fontRef idx="minor">
+            <a:schemeClr val="tx1"/>
+          </a:fontRef>
+        </p:style>
+      </p:cxnSp>
+      <p:cxnSp>
+        <p:nvCxnSpPr>
+          <p:cNvPr id="78" name="Connector: Elbow 77">
+            <a:extLst>
+              <a:ext uri="{FF2B5EF4-FFF2-40B4-BE49-F238E27FC236}">
+                <a16:creationId xmlns:a16="http://schemas.microsoft.com/office/drawing/2014/main" id="{D115C67D-44C7-9A48-80F7-81C2995A0B5E}"/>
+              </a:ext>
+            </a:extLst>
+          </p:cNvPr>
+          <p:cNvCxnSpPr>
+            <a:cxnSpLocks/>
+            <a:stCxn id="6" idx="6"/>
+            <a:endCxn id="33" idx="2"/>
+          </p:cNvCxnSpPr>
+          <p:nvPr/>
+        </p:nvCxnSpPr>
+        <p:spPr>
+          <a:xfrm flipV="1">
+            <a:off x="5372820" y="3861914"/>
+            <a:ext cx="864662" cy="1929"/>
+          </a:xfrm>
+          <a:prstGeom prst="bentConnector3">
+            <a:avLst>
+              <a:gd name="adj1" fmla="val 50000"/>
+            </a:avLst>
+          </a:prstGeom>
+          <a:ln>
+            <a:headEnd type="triangle"/>
+            <a:tailEnd type="triangle"/>
+          </a:ln>
+        </p:spPr>
+        <p:style>
+          <a:lnRef idx="1">
+            <a:schemeClr val="accent1"/>
+          </a:lnRef>
+          <a:fillRef idx="0">
+            <a:schemeClr val="accent1"/>
+          </a:fillRef>
+          <a:effectRef idx="0">
+            <a:schemeClr val="accent1"/>
+          </a:effectRef>
+          <a:fontRef idx="minor">
+            <a:schemeClr val="tx1"/>
+          </a:fontRef>
+        </p:style>
+      </p:cxnSp>
+      <p:cxnSp>
+        <p:nvCxnSpPr>
+          <p:cNvPr id="80" name="Connector: Elbow 79">
+            <a:extLst>
+              <a:ext uri="{FF2B5EF4-FFF2-40B4-BE49-F238E27FC236}">
+                <a16:creationId xmlns:a16="http://schemas.microsoft.com/office/drawing/2014/main" id="{CA280E45-3E1D-834E-8B0C-961C9877D030}"/>
+              </a:ext>
+            </a:extLst>
+          </p:cNvPr>
+          <p:cNvCxnSpPr>
+            <a:cxnSpLocks/>
+            <a:stCxn id="27" idx="6"/>
+            <a:endCxn id="6" idx="2"/>
+          </p:cNvCxnSpPr>
+          <p:nvPr/>
+        </p:nvCxnSpPr>
+        <p:spPr>
+          <a:xfrm flipV="1">
+            <a:off x="3493392" y="3863843"/>
+            <a:ext cx="1274667" cy="1604"/>
+          </a:xfrm>
+          <a:prstGeom prst="bentConnector3">
+            <a:avLst>
+              <a:gd name="adj1" fmla="val 50000"/>
+            </a:avLst>
+          </a:prstGeom>
+          <a:ln>
+            <a:headEnd type="triangle"/>
+            <a:tailEnd type="triangle"/>
+          </a:ln>
+        </p:spPr>
+        <p:style>
+          <a:lnRef idx="1">
+            <a:schemeClr val="accent1"/>
+          </a:lnRef>
+          <a:fillRef idx="0">
+            <a:schemeClr val="accent1"/>
+          </a:fillRef>
+          <a:effectRef idx="0">
+            <a:schemeClr val="accent1"/>
+          </a:effectRef>
+          <a:fontRef idx="minor">
+            <a:schemeClr val="tx1"/>
+          </a:fontRef>
+        </p:style>
+      </p:cxnSp>
+      <p:cxnSp>
+        <p:nvCxnSpPr>
+          <p:cNvPr id="91" name="Connector: Elbow 90">
+            <a:extLst>
+              <a:ext uri="{FF2B5EF4-FFF2-40B4-BE49-F238E27FC236}">
+                <a16:creationId xmlns:a16="http://schemas.microsoft.com/office/drawing/2014/main" id="{A9531169-6F43-AA4E-90F5-64F7C20C2205}"/>
+              </a:ext>
+            </a:extLst>
+          </p:cNvPr>
+          <p:cNvCxnSpPr>
+            <a:cxnSpLocks/>
+            <a:stCxn id="4" idx="6"/>
+            <a:endCxn id="16" idx="2"/>
+          </p:cNvCxnSpPr>
+          <p:nvPr/>
+        </p:nvCxnSpPr>
+        <p:spPr>
+          <a:xfrm>
+            <a:off x="6663117" y="6036471"/>
+            <a:ext cx="832504" cy="154024"/>
+          </a:xfrm>
+          <a:prstGeom prst="bentConnector3">
+            <a:avLst>
+              <a:gd name="adj1" fmla="val 50000"/>
+            </a:avLst>
+          </a:prstGeom>
+          <a:ln>
+            <a:headEnd type="triangle"/>
+            <a:tailEnd type="triangle"/>
+          </a:ln>
+        </p:spPr>
+        <p:style>
+          <a:lnRef idx="1">
+            <a:schemeClr val="accent1"/>
+          </a:lnRef>
+          <a:fillRef idx="0">
+            <a:schemeClr val="accent1"/>
+          </a:fillRef>
+          <a:effectRef idx="0">
+            <a:schemeClr val="accent1"/>
+          </a:effectRef>
+          <a:fontRef idx="minor">
+            <a:schemeClr val="tx1"/>
+          </a:fontRef>
+        </p:style>
+      </p:cxnSp>
+      <p:sp>
+        <p:nvSpPr>
+          <p:cNvPr id="105" name="Oval 104">
+            <a:extLst>
+              <a:ext uri="{FF2B5EF4-FFF2-40B4-BE49-F238E27FC236}">
+                <a16:creationId xmlns:a16="http://schemas.microsoft.com/office/drawing/2014/main" id="{9A11DAEA-6517-0A42-BEB4-F5396566CFE5}"/>
+              </a:ext>
+            </a:extLst>
+          </p:cNvPr>
+          <p:cNvSpPr/>
+          <p:nvPr/>
+        </p:nvSpPr>
+        <p:spPr>
+          <a:xfrm>
+            <a:off x="5773924" y="2257462"/>
+            <a:ext cx="604761" cy="604761"/>
+          </a:xfrm>
+          <a:prstGeom prst="ellipse">
+            <a:avLst/>
+          </a:prstGeom>
+          <a:solidFill>
+            <a:schemeClr val="accent1">
+              <a:lumMod val="60000"/>
+              <a:lumOff val="40000"/>
+            </a:schemeClr>
+          </a:solidFill>
+        </p:spPr>
+        <p:style>
+          <a:lnRef idx="2">
+            <a:schemeClr val="accent1">
+              <a:shade val="50000"/>
+            </a:schemeClr>
+          </a:lnRef>
+          <a:fillRef idx="1">
+            <a:schemeClr val="accent1"/>
+          </a:fillRef>
+          <a:effectRef idx="0">
+            <a:schemeClr val="accent1"/>
+          </a:effectRef>
+          <a:fontRef idx="minor">
+            <a:schemeClr val="lt1"/>
+          </a:fontRef>
+        </p:style>
+        <p:txBody>
+          <a:bodyPr rtlCol="0" anchor="ctr"/>
+          <a:lstStyle/>
+          <a:p>
+            <a:pPr algn="ctr"/>
+            <a:r>
+              <a:rPr lang="fi-FI" dirty="0"/>
+              <a:t>8</a:t>
+            </a:r>
+            <a:endParaRPr lang="en-FI" dirty="0"/>
+          </a:p>
+        </p:txBody>
+      </p:sp>
+      <p:sp>
+        <p:nvSpPr>
+          <p:cNvPr id="107" name="Oval 106">
+            <a:extLst>
+              <a:ext uri="{FF2B5EF4-FFF2-40B4-BE49-F238E27FC236}">
+                <a16:creationId xmlns:a16="http://schemas.microsoft.com/office/drawing/2014/main" id="{7C5403E1-B0D8-ED44-B21B-91CF056326CC}"/>
+              </a:ext>
+            </a:extLst>
+          </p:cNvPr>
+          <p:cNvSpPr/>
+          <p:nvPr/>
+        </p:nvSpPr>
+        <p:spPr>
+          <a:xfrm>
+            <a:off x="8385451" y="5129329"/>
+            <a:ext cx="604761" cy="604761"/>
+          </a:xfrm>
+          <a:prstGeom prst="ellipse">
+            <a:avLst/>
+          </a:prstGeom>
+          <a:solidFill>
+            <a:schemeClr val="accent1">
+              <a:lumMod val="60000"/>
+              <a:lumOff val="40000"/>
+            </a:schemeClr>
+          </a:solidFill>
+        </p:spPr>
+        <p:style>
+          <a:lnRef idx="2">
+            <a:schemeClr val="accent1">
+              <a:shade val="50000"/>
+            </a:schemeClr>
+          </a:lnRef>
+          <a:fillRef idx="1">
+            <a:schemeClr val="accent1"/>
+          </a:fillRef>
+          <a:effectRef idx="0">
+            <a:schemeClr val="accent1"/>
+          </a:effectRef>
+          <a:fontRef idx="minor">
+            <a:schemeClr val="lt1"/>
+          </a:fontRef>
+        </p:style>
+        <p:txBody>
+          <a:bodyPr rtlCol="0" anchor="ctr"/>
+          <a:lstStyle/>
+          <a:p>
+            <a:pPr algn="ctr"/>
+            <a:r>
+              <a:rPr lang="fi-FI"/>
+              <a:t>14</a:t>
+            </a:r>
+            <a:endParaRPr lang="en-FI" dirty="0"/>
+          </a:p>
+        </p:txBody>
+      </p:sp>
+      <p:cxnSp>
+        <p:nvCxnSpPr>
+          <p:cNvPr id="109" name="Connector: Elbow 108">
+            <a:extLst>
+              <a:ext uri="{FF2B5EF4-FFF2-40B4-BE49-F238E27FC236}">
+                <a16:creationId xmlns:a16="http://schemas.microsoft.com/office/drawing/2014/main" id="{3225C2F2-B3B4-7840-ACF2-E1DA3FC4AA48}"/>
+              </a:ext>
+            </a:extLst>
+          </p:cNvPr>
+          <p:cNvCxnSpPr>
+            <a:cxnSpLocks/>
+            <a:stCxn id="105" idx="6"/>
+            <a:endCxn id="12" idx="2"/>
+          </p:cNvCxnSpPr>
+          <p:nvPr/>
+        </p:nvCxnSpPr>
+        <p:spPr>
+          <a:xfrm flipV="1">
+            <a:off x="6378685" y="2559842"/>
+            <a:ext cx="752573" cy="1"/>
+          </a:xfrm>
+          <a:prstGeom prst="bentConnector3">
+            <a:avLst>
+              <a:gd name="adj1" fmla="val 50000"/>
+            </a:avLst>
+          </a:prstGeom>
+          <a:ln>
+            <a:headEnd type="triangle"/>
+            <a:tailEnd type="triangle"/>
+          </a:ln>
+        </p:spPr>
+        <p:style>
+          <a:lnRef idx="1">
+            <a:schemeClr val="accent1"/>
+          </a:lnRef>
+          <a:fillRef idx="0">
+            <a:schemeClr val="accent1"/>
+          </a:fillRef>
+          <a:effectRef idx="0">
+            <a:schemeClr val="accent1"/>
+          </a:effectRef>
+          <a:fontRef idx="minor">
+            <a:schemeClr val="tx1"/>
+          </a:fontRef>
+        </p:style>
+      </p:cxnSp>
+      <p:cxnSp>
+        <p:nvCxnSpPr>
+          <p:cNvPr id="111" name="Connector: Elbow 110">
+            <a:extLst>
+              <a:ext uri="{FF2B5EF4-FFF2-40B4-BE49-F238E27FC236}">
+                <a16:creationId xmlns:a16="http://schemas.microsoft.com/office/drawing/2014/main" id="{AB53BCAE-B8E8-0F4E-96AC-45335F420C82}"/>
+              </a:ext>
+            </a:extLst>
+          </p:cNvPr>
+          <p:cNvCxnSpPr>
+            <a:cxnSpLocks/>
+            <a:stCxn id="14" idx="6"/>
+            <a:endCxn id="29" idx="6"/>
+          </p:cNvCxnSpPr>
+          <p:nvPr/>
+        </p:nvCxnSpPr>
+        <p:spPr>
+          <a:xfrm flipH="1">
+            <a:off x="10272207" y="4057654"/>
+            <a:ext cx="677234" cy="869155"/>
+          </a:xfrm>
+          <a:prstGeom prst="bentConnector3">
+            <a:avLst>
+              <a:gd name="adj1" fmla="val -33755"/>
+            </a:avLst>
+          </a:prstGeom>
+          <a:ln>
+            <a:headEnd type="triangle"/>
+            <a:tailEnd type="triangle"/>
+          </a:ln>
+        </p:spPr>
+        <p:style>
+          <a:lnRef idx="1">
+            <a:schemeClr val="accent1"/>
+          </a:lnRef>
+          <a:fillRef idx="0">
+            <a:schemeClr val="accent1"/>
+          </a:fillRef>
+          <a:effectRef idx="0">
+            <a:schemeClr val="accent1"/>
+          </a:effectRef>
+          <a:fontRef idx="minor">
+            <a:schemeClr val="tx1"/>
+          </a:fontRef>
+        </p:style>
+      </p:cxnSp>
+      <p:sp>
+        <p:nvSpPr>
+          <p:cNvPr id="129" name="Oval 128">
+            <a:extLst>
+              <a:ext uri="{FF2B5EF4-FFF2-40B4-BE49-F238E27FC236}">
+                <a16:creationId xmlns:a16="http://schemas.microsoft.com/office/drawing/2014/main" id="{A0176472-59B9-7141-94EC-705C340CCA30}"/>
+              </a:ext>
+            </a:extLst>
+          </p:cNvPr>
+          <p:cNvSpPr/>
+          <p:nvPr/>
+        </p:nvSpPr>
+        <p:spPr>
+          <a:xfrm>
+            <a:off x="8880393" y="3693396"/>
+            <a:ext cx="604761" cy="604761"/>
+          </a:xfrm>
+          <a:prstGeom prst="ellipse">
+            <a:avLst/>
+          </a:prstGeom>
+          <a:solidFill>
+            <a:schemeClr val="accent1">
+              <a:lumMod val="20000"/>
+              <a:lumOff val="80000"/>
+            </a:schemeClr>
+          </a:solidFill>
+        </p:spPr>
+        <p:style>
+          <a:lnRef idx="2">
+            <a:schemeClr val="accent1">
+              <a:shade val="50000"/>
+            </a:schemeClr>
+          </a:lnRef>
+          <a:fillRef idx="1">
+            <a:schemeClr val="accent1"/>
+          </a:fillRef>
+          <a:effectRef idx="0">
+            <a:schemeClr val="accent1"/>
+          </a:effectRef>
+          <a:fontRef idx="minor">
+            <a:schemeClr val="lt1"/>
+          </a:fontRef>
+        </p:style>
+        <p:txBody>
+          <a:bodyPr rtlCol="0" anchor="ctr"/>
+          <a:lstStyle/>
+          <a:p>
+            <a:pPr algn="ctr"/>
+            <a:r>
+              <a:rPr lang="fi-FI" dirty="0"/>
+              <a:t>5</a:t>
+            </a:r>
+            <a:endParaRPr lang="en-FI" dirty="0"/>
+          </a:p>
+        </p:txBody>
+      </p:sp>
+      <p:cxnSp>
+        <p:nvCxnSpPr>
+          <p:cNvPr id="131" name="Connector: Elbow 130">
+            <a:extLst>
+              <a:ext uri="{FF2B5EF4-FFF2-40B4-BE49-F238E27FC236}">
+                <a16:creationId xmlns:a16="http://schemas.microsoft.com/office/drawing/2014/main" id="{E1591F38-446B-144A-9E08-CAA95183959E}"/>
+              </a:ext>
+            </a:extLst>
+          </p:cNvPr>
+          <p:cNvCxnSpPr>
+            <a:cxnSpLocks/>
+            <a:stCxn id="129" idx="6"/>
+            <a:endCxn id="14" idx="2"/>
+          </p:cNvCxnSpPr>
+          <p:nvPr/>
+        </p:nvCxnSpPr>
+        <p:spPr>
+          <a:xfrm>
+            <a:off x="9485154" y="3995777"/>
+            <a:ext cx="859526" cy="61877"/>
+          </a:xfrm>
+          <a:prstGeom prst="bentConnector3">
+            <a:avLst>
+              <a:gd name="adj1" fmla="val 50000"/>
+            </a:avLst>
+          </a:prstGeom>
+          <a:ln>
+            <a:headEnd type="triangle"/>
+            <a:tailEnd type="triangle"/>
+          </a:ln>
+        </p:spPr>
+        <p:style>
+          <a:lnRef idx="1">
+            <a:schemeClr val="accent1"/>
+          </a:lnRef>
+          <a:fillRef idx="0">
+            <a:schemeClr val="accent1"/>
+          </a:fillRef>
+          <a:effectRef idx="0">
+            <a:schemeClr val="accent1"/>
+          </a:effectRef>
+          <a:fontRef idx="minor">
+            <a:schemeClr val="tx1"/>
+          </a:fontRef>
+        </p:style>
+      </p:cxnSp>
+      <p:cxnSp>
+        <p:nvCxnSpPr>
+          <p:cNvPr id="133" name="Connector: Elbow 132">
+            <a:extLst>
+              <a:ext uri="{FF2B5EF4-FFF2-40B4-BE49-F238E27FC236}">
+                <a16:creationId xmlns:a16="http://schemas.microsoft.com/office/drawing/2014/main" id="{22B101A6-F3B8-1C46-A2CF-85AD1D793F45}"/>
+              </a:ext>
+            </a:extLst>
+          </p:cNvPr>
+          <p:cNvCxnSpPr>
+            <a:cxnSpLocks/>
+            <a:stCxn id="3" idx="6"/>
+            <a:endCxn id="129" idx="2"/>
+          </p:cNvCxnSpPr>
+          <p:nvPr/>
+        </p:nvCxnSpPr>
+        <p:spPr>
+          <a:xfrm>
+            <a:off x="8402762" y="3995777"/>
+            <a:ext cx="477631" cy="12700"/>
+          </a:xfrm>
+          <a:prstGeom prst="bentConnector3">
+            <a:avLst>
+              <a:gd name="adj1" fmla="val 50000"/>
+            </a:avLst>
+          </a:prstGeom>
+          <a:ln>
+            <a:headEnd type="triangle"/>
+            <a:tailEnd type="triangle"/>
+          </a:ln>
+        </p:spPr>
+        <p:style>
+          <a:lnRef idx="1">
+            <a:schemeClr val="accent1"/>
+          </a:lnRef>
+          <a:fillRef idx="0">
+            <a:schemeClr val="accent1"/>
+          </a:fillRef>
+          <a:effectRef idx="0">
+            <a:schemeClr val="accent1"/>
+          </a:effectRef>
+          <a:fontRef idx="minor">
+            <a:schemeClr val="tx1"/>
+          </a:fontRef>
+        </p:style>
+      </p:cxnSp>
+      <p:sp>
+        <p:nvSpPr>
+          <p:cNvPr id="3" name="Oval 2">
+            <a:extLst>
+              <a:ext uri="{FF2B5EF4-FFF2-40B4-BE49-F238E27FC236}">
+                <a16:creationId xmlns:a16="http://schemas.microsoft.com/office/drawing/2014/main" id="{E3943198-076D-6C40-A154-18E9B788600F}"/>
+              </a:ext>
+            </a:extLst>
+          </p:cNvPr>
+          <p:cNvSpPr/>
+          <p:nvPr/>
+        </p:nvSpPr>
+        <p:spPr>
+          <a:xfrm>
+            <a:off x="7798001" y="3693396"/>
+            <a:ext cx="604761" cy="604761"/>
+          </a:xfrm>
+          <a:prstGeom prst="ellipse">
+            <a:avLst/>
+          </a:prstGeom>
+          <a:solidFill>
+            <a:schemeClr val="accent1">
+              <a:lumMod val="60000"/>
+              <a:lumOff val="40000"/>
+            </a:schemeClr>
+          </a:solidFill>
+        </p:spPr>
+        <p:style>
+          <a:lnRef idx="2">
+            <a:schemeClr val="accent1">
+              <a:shade val="50000"/>
+            </a:schemeClr>
+          </a:lnRef>
+          <a:fillRef idx="1">
+            <a:schemeClr val="accent1"/>
+          </a:fillRef>
+          <a:effectRef idx="0">
+            <a:schemeClr val="accent1"/>
+          </a:effectRef>
+          <a:fontRef idx="minor">
+            <a:schemeClr val="lt1"/>
+          </a:fontRef>
+        </p:style>
+        <p:txBody>
+          <a:bodyPr rtlCol="0" anchor="ctr"/>
+          <a:lstStyle/>
+          <a:p>
+            <a:pPr algn="ctr"/>
+            <a:r>
+              <a:rPr lang="fi-FI" dirty="0"/>
+              <a:t>4</a:t>
+            </a:r>
+            <a:endParaRPr lang="en-FI" dirty="0"/>
+          </a:p>
+        </p:txBody>
+      </p:sp>
+      <p:cxnSp>
+        <p:nvCxnSpPr>
+          <p:cNvPr id="10" name="Connector: Elbow 9">
+            <a:extLst>
+              <a:ext uri="{FF2B5EF4-FFF2-40B4-BE49-F238E27FC236}">
+                <a16:creationId xmlns:a16="http://schemas.microsoft.com/office/drawing/2014/main" id="{1B4F6596-F612-0C4A-9EC3-1E5C7ACCF0E4}"/>
+              </a:ext>
+            </a:extLst>
+          </p:cNvPr>
+          <p:cNvCxnSpPr>
+            <a:cxnSpLocks/>
+            <a:stCxn id="3" idx="2"/>
+            <a:endCxn id="33" idx="6"/>
+          </p:cNvCxnSpPr>
+          <p:nvPr/>
+        </p:nvCxnSpPr>
+        <p:spPr>
+          <a:xfrm rot="10800000">
+            <a:off x="6842243" y="3861915"/>
+            <a:ext cx="955758" cy="133863"/>
+          </a:xfrm>
+          <a:prstGeom prst="bentConnector3">
+            <a:avLst>
+              <a:gd name="adj1" fmla="val 50000"/>
+            </a:avLst>
+          </a:prstGeom>
+          <a:ln>
+            <a:headEnd type="triangle"/>
+            <a:tailEnd type="triangle"/>
+          </a:ln>
+        </p:spPr>
+        <p:style>
+          <a:lnRef idx="1">
+            <a:schemeClr val="accent1"/>
+          </a:lnRef>
+          <a:fillRef idx="0">
+            <a:schemeClr val="accent1"/>
+          </a:fillRef>
+          <a:effectRef idx="0">
+            <a:schemeClr val="accent1"/>
+          </a:effectRef>
+          <a:fontRef idx="minor">
+            <a:schemeClr val="tx1"/>
+          </a:fontRef>
+        </p:style>
+      </p:cxnSp>
+      <p:sp>
+        <p:nvSpPr>
+          <p:cNvPr id="7" name="Oval 6">
+            <a:extLst>
+              <a:ext uri="{FF2B5EF4-FFF2-40B4-BE49-F238E27FC236}">
+                <a16:creationId xmlns:a16="http://schemas.microsoft.com/office/drawing/2014/main" id="{0B68FD0E-0AA6-8843-8BC1-0D16EDFAA799}"/>
+              </a:ext>
+            </a:extLst>
+          </p:cNvPr>
+          <p:cNvSpPr/>
+          <p:nvPr/>
+        </p:nvSpPr>
+        <p:spPr>
+          <a:xfrm>
+            <a:off x="4768059" y="5744713"/>
+            <a:ext cx="604761" cy="604761"/>
+          </a:xfrm>
+          <a:prstGeom prst="ellipse">
+            <a:avLst/>
+          </a:prstGeom>
+          <a:solidFill>
+            <a:schemeClr val="accent1"/>
+          </a:solidFill>
+        </p:spPr>
+        <p:style>
+          <a:lnRef idx="2">
+            <a:schemeClr val="accent1">
+              <a:shade val="50000"/>
+            </a:schemeClr>
+          </a:lnRef>
+          <a:fillRef idx="1">
+            <a:schemeClr val="accent1"/>
+          </a:fillRef>
+          <a:effectRef idx="0">
+            <a:schemeClr val="accent1"/>
+          </a:effectRef>
+          <a:fontRef idx="minor">
+            <a:schemeClr val="lt1"/>
+          </a:fontRef>
+        </p:style>
+        <p:txBody>
+          <a:bodyPr rtlCol="0" anchor="ctr"/>
+          <a:lstStyle/>
+          <a:p>
+            <a:pPr algn="ctr"/>
+            <a:r>
+              <a:rPr lang="fi-FI" dirty="0"/>
+              <a:t>11</a:t>
+            </a:r>
+            <a:endParaRPr lang="en-FI" dirty="0"/>
+          </a:p>
+        </p:txBody>
+      </p:sp>
+      <p:cxnSp>
+        <p:nvCxnSpPr>
+          <p:cNvPr id="9" name="Connector: Elbow 8">
+            <a:extLst>
+              <a:ext uri="{FF2B5EF4-FFF2-40B4-BE49-F238E27FC236}">
+                <a16:creationId xmlns:a16="http://schemas.microsoft.com/office/drawing/2014/main" id="{D2768F06-D620-8E4E-BA6B-4F14CC815F3E}"/>
+              </a:ext>
+            </a:extLst>
+          </p:cNvPr>
+          <p:cNvCxnSpPr>
+            <a:cxnSpLocks/>
+            <a:stCxn id="7" idx="6"/>
+            <a:endCxn id="4" idx="2"/>
+          </p:cNvCxnSpPr>
+          <p:nvPr/>
+        </p:nvCxnSpPr>
+        <p:spPr>
+          <a:xfrm flipV="1">
+            <a:off x="5372820" y="6036471"/>
+            <a:ext cx="685536" cy="10623"/>
+          </a:xfrm>
+          <a:prstGeom prst="bentConnector3">
+            <a:avLst>
+              <a:gd name="adj1" fmla="val 50000"/>
+            </a:avLst>
+          </a:prstGeom>
+          <a:ln>
+            <a:headEnd type="triangle"/>
+            <a:tailEnd type="triangle"/>
+          </a:ln>
+        </p:spPr>
+        <p:style>
+          <a:lnRef idx="1">
+            <a:schemeClr val="accent1"/>
+          </a:lnRef>
+          <a:fillRef idx="0">
+            <a:schemeClr val="accent1"/>
+          </a:fillRef>
+          <a:effectRef idx="0">
+            <a:schemeClr val="accent1"/>
+          </a:effectRef>
+          <a:fontRef idx="minor">
+            <a:schemeClr val="tx1"/>
+          </a:fontRef>
+        </p:style>
+      </p:cxnSp>
+      <p:cxnSp>
+        <p:nvCxnSpPr>
+          <p:cNvPr id="13" name="Connector: Elbow 12">
+            <a:extLst>
+              <a:ext uri="{FF2B5EF4-FFF2-40B4-BE49-F238E27FC236}">
+                <a16:creationId xmlns:a16="http://schemas.microsoft.com/office/drawing/2014/main" id="{D204E305-4A9D-F14E-B89C-FD2B5D8C8786}"/>
+              </a:ext>
+            </a:extLst>
+          </p:cNvPr>
+          <p:cNvCxnSpPr>
+            <a:cxnSpLocks/>
+            <a:stCxn id="31" idx="4"/>
+            <a:endCxn id="7" idx="0"/>
+          </p:cNvCxnSpPr>
+          <p:nvPr/>
+        </p:nvCxnSpPr>
+        <p:spPr>
+          <a:xfrm rot="16200000" flipH="1">
+            <a:off x="4291106" y="4965378"/>
+            <a:ext cx="365111" cy="1193557"/>
+          </a:xfrm>
+          <a:prstGeom prst="bentConnector3">
+            <a:avLst>
+              <a:gd name="adj1" fmla="val 50000"/>
+            </a:avLst>
+          </a:prstGeom>
+          <a:ln>
+            <a:headEnd type="triangle"/>
+            <a:tailEnd type="triangle"/>
+          </a:ln>
+        </p:spPr>
+        <p:style>
+          <a:lnRef idx="1">
+            <a:schemeClr val="accent1"/>
+          </a:lnRef>
+          <a:fillRef idx="0">
+            <a:schemeClr val="accent1"/>
+          </a:fillRef>
+          <a:effectRef idx="0">
+            <a:schemeClr val="accent1"/>
+          </a:effectRef>
+          <a:fontRef idx="minor">
+            <a:schemeClr val="tx1"/>
+          </a:fontRef>
+        </p:style>
+      </p:cxnSp>
+      <p:sp>
+        <p:nvSpPr>
+          <p:cNvPr id="59" name="Oval 7">
+            <a:extLst>
+              <a:ext uri="{FF2B5EF4-FFF2-40B4-BE49-F238E27FC236}">
+                <a16:creationId xmlns:a16="http://schemas.microsoft.com/office/drawing/2014/main" id="{88522843-F045-40F4-BF53-4ED6894AABF5}"/>
+              </a:ext>
+            </a:extLst>
+          </p:cNvPr>
+          <p:cNvSpPr/>
+          <p:nvPr/>
+        </p:nvSpPr>
+        <p:spPr>
+          <a:xfrm>
+            <a:off x="3005336" y="2118025"/>
+            <a:ext cx="604761" cy="604761"/>
+          </a:xfrm>
+          <a:prstGeom prst="ellipse">
+            <a:avLst/>
+          </a:prstGeom>
+          <a:solidFill>
+            <a:schemeClr val="accent1">
+              <a:lumMod val="50000"/>
+            </a:schemeClr>
+          </a:solidFill>
+        </p:spPr>
+        <p:style>
+          <a:lnRef idx="2">
+            <a:schemeClr val="accent1">
+              <a:shade val="50000"/>
+            </a:schemeClr>
+          </a:lnRef>
+          <a:fillRef idx="1">
+            <a:schemeClr val="accent1"/>
+          </a:fillRef>
+          <a:effectRef idx="0">
+            <a:schemeClr val="accent1"/>
+          </a:effectRef>
+          <a:fontRef idx="minor">
+            <a:schemeClr val="lt1"/>
+          </a:fontRef>
+        </p:style>
+        <p:txBody>
+          <a:bodyPr rtlCol="0" anchor="ctr"/>
+          <a:lstStyle/>
+          <a:p>
+            <a:pPr algn="ctr"/>
+            <a:r>
+              <a:rPr lang="fi-FI" dirty="0"/>
+              <a:t>6</a:t>
+            </a:r>
+            <a:endParaRPr lang="en-FI" dirty="0"/>
+          </a:p>
+        </p:txBody>
+      </p:sp>
+      <p:cxnSp>
+        <p:nvCxnSpPr>
+          <p:cNvPr id="61" name="Connector: Elbow 79">
+            <a:extLst>
+              <a:ext uri="{FF2B5EF4-FFF2-40B4-BE49-F238E27FC236}">
+                <a16:creationId xmlns:a16="http://schemas.microsoft.com/office/drawing/2014/main" id="{AD82777F-872D-4B14-A85C-3A429863C4CF}"/>
+              </a:ext>
+            </a:extLst>
+          </p:cNvPr>
+          <p:cNvCxnSpPr>
+            <a:cxnSpLocks/>
+            <a:stCxn id="25" idx="0"/>
+            <a:endCxn id="59" idx="2"/>
+          </p:cNvCxnSpPr>
+          <p:nvPr/>
+        </p:nvCxnSpPr>
+        <p:spPr>
+          <a:xfrm rot="5400000" flipH="1" flipV="1">
+            <a:off x="1837937" y="2392134"/>
+            <a:ext cx="1139127" cy="1195672"/>
+          </a:xfrm>
+          <a:prstGeom prst="bentConnector2">
+            <a:avLst/>
+          </a:prstGeom>
+          <a:ln>
+            <a:headEnd type="triangle"/>
+            <a:tailEnd type="triangle"/>
+          </a:ln>
+        </p:spPr>
+        <p:style>
+          <a:lnRef idx="1">
+            <a:schemeClr val="accent1"/>
+          </a:lnRef>
+          <a:fillRef idx="0">
+            <a:schemeClr val="accent1"/>
+          </a:fillRef>
+          <a:effectRef idx="0">
+            <a:schemeClr val="accent1"/>
+          </a:effectRef>
+          <a:fontRef idx="minor">
+            <a:schemeClr val="tx1"/>
+          </a:fontRef>
+        </p:style>
+      </p:cxnSp>
+      <p:cxnSp>
+        <p:nvCxnSpPr>
+          <p:cNvPr id="63" name="Connector: Elbow 79">
+            <a:extLst>
+              <a:ext uri="{FF2B5EF4-FFF2-40B4-BE49-F238E27FC236}">
+                <a16:creationId xmlns:a16="http://schemas.microsoft.com/office/drawing/2014/main" id="{FF970E6E-67C5-4A20-ADC9-78BD66488812}"/>
+              </a:ext>
+            </a:extLst>
+          </p:cNvPr>
+          <p:cNvCxnSpPr>
+            <a:cxnSpLocks/>
+            <a:stCxn id="59" idx="6"/>
+            <a:endCxn id="8" idx="2"/>
+          </p:cNvCxnSpPr>
+          <p:nvPr/>
+        </p:nvCxnSpPr>
+        <p:spPr>
+          <a:xfrm>
+            <a:off x="3610097" y="2420406"/>
+            <a:ext cx="768575" cy="139438"/>
+          </a:xfrm>
+          <a:prstGeom prst="bentConnector3">
+            <a:avLst>
+              <a:gd name="adj1" fmla="val 50000"/>
+            </a:avLst>
+          </a:prstGeom>
+          <a:ln>
+            <a:headEnd type="triangle"/>
+            <a:tailEnd type="triangle"/>
+          </a:ln>
+        </p:spPr>
+        <p:style>
+          <a:lnRef idx="1">
+            <a:schemeClr val="accent1"/>
+          </a:lnRef>
+          <a:fillRef idx="0">
+            <a:schemeClr val="accent1"/>
+          </a:fillRef>
+          <a:effectRef idx="0">
+            <a:schemeClr val="accent1"/>
+          </a:effectRef>
+          <a:fontRef idx="minor">
+            <a:schemeClr val="tx1"/>
+          </a:fontRef>
+        </p:style>
+      </p:cxnSp>
+      <p:sp>
+        <p:nvSpPr>
+          <p:cNvPr id="89" name="Oval 104">
+            <a:extLst>
+              <a:ext uri="{FF2B5EF4-FFF2-40B4-BE49-F238E27FC236}">
+                <a16:creationId xmlns:a16="http://schemas.microsoft.com/office/drawing/2014/main" id="{55A3B038-F168-4E9E-BB2E-19A6DC59EDE1}"/>
+              </a:ext>
+            </a:extLst>
+          </p:cNvPr>
+          <p:cNvSpPr/>
+          <p:nvPr/>
+        </p:nvSpPr>
+        <p:spPr>
+          <a:xfrm>
+            <a:off x="8339196" y="1590827"/>
+            <a:ext cx="604761" cy="604761"/>
+          </a:xfrm>
+          <a:prstGeom prst="ellipse">
+            <a:avLst/>
+          </a:prstGeom>
+          <a:solidFill>
+            <a:schemeClr val="accent1">
+              <a:lumMod val="60000"/>
+              <a:lumOff val="40000"/>
+            </a:schemeClr>
+          </a:solidFill>
+        </p:spPr>
+        <p:style>
+          <a:lnRef idx="2">
+            <a:schemeClr val="accent1">
+              <a:shade val="50000"/>
+            </a:schemeClr>
+          </a:lnRef>
+          <a:fillRef idx="1">
+            <a:schemeClr val="accent1"/>
+          </a:fillRef>
+          <a:effectRef idx="0">
+            <a:schemeClr val="accent1"/>
+          </a:effectRef>
+          <a:fontRef idx="minor">
+            <a:schemeClr val="lt1"/>
+          </a:fontRef>
+        </p:style>
+        <p:txBody>
+          <a:bodyPr rtlCol="0" anchor="ctr"/>
+          <a:lstStyle/>
+          <a:p>
+            <a:pPr algn="ctr"/>
+            <a:r>
+              <a:rPr lang="fi-FI" sz="1200" dirty="0"/>
+              <a:t>ded1</a:t>
+            </a:r>
+            <a:endParaRPr lang="en-FI" sz="1200" dirty="0"/>
+          </a:p>
+        </p:txBody>
+      </p:sp>
+      <p:sp>
+        <p:nvSpPr>
+          <p:cNvPr id="90" name="Oval 104">
+            <a:extLst>
+              <a:ext uri="{FF2B5EF4-FFF2-40B4-BE49-F238E27FC236}">
+                <a16:creationId xmlns:a16="http://schemas.microsoft.com/office/drawing/2014/main" id="{F86DDE48-70B8-4ED7-B05E-8545A84E8D34}"/>
+              </a:ext>
+            </a:extLst>
+          </p:cNvPr>
+          <p:cNvSpPr/>
+          <p:nvPr/>
+        </p:nvSpPr>
+        <p:spPr>
+          <a:xfrm>
+            <a:off x="9328829" y="1702633"/>
+            <a:ext cx="604761" cy="604761"/>
+          </a:xfrm>
+          <a:prstGeom prst="ellipse">
+            <a:avLst/>
+          </a:prstGeom>
+          <a:solidFill>
+            <a:schemeClr val="accent1">
+              <a:lumMod val="50000"/>
+            </a:schemeClr>
+          </a:solidFill>
+        </p:spPr>
+        <p:style>
+          <a:lnRef idx="2">
+            <a:schemeClr val="accent1">
+              <a:shade val="50000"/>
+            </a:schemeClr>
+          </a:lnRef>
+          <a:fillRef idx="1">
+            <a:schemeClr val="accent1"/>
+          </a:fillRef>
+          <a:effectRef idx="0">
+            <a:schemeClr val="accent1"/>
+          </a:effectRef>
+          <a:fontRef idx="minor">
+            <a:schemeClr val="lt1"/>
+          </a:fontRef>
+        </p:style>
+        <p:txBody>
+          <a:bodyPr rtlCol="0" anchor="ctr"/>
+          <a:lstStyle/>
+          <a:p>
+            <a:pPr algn="ctr"/>
+            <a:r>
+              <a:rPr lang="fi-FI" sz="1200"/>
+              <a:t>ded2</a:t>
+            </a:r>
+            <a:endParaRPr lang="en-FI" sz="1200" dirty="0"/>
+          </a:p>
+        </p:txBody>
+      </p:sp>
+      <p:cxnSp>
+        <p:nvCxnSpPr>
+          <p:cNvPr id="93" name="Connector: Elbow 16">
+            <a:extLst>
+              <a:ext uri="{FF2B5EF4-FFF2-40B4-BE49-F238E27FC236}">
+                <a16:creationId xmlns:a16="http://schemas.microsoft.com/office/drawing/2014/main" id="{40D25137-000B-49F0-83A4-B286648CC6B0}"/>
+              </a:ext>
+            </a:extLst>
+          </p:cNvPr>
+          <p:cNvCxnSpPr>
+            <a:cxnSpLocks/>
+            <a:stCxn id="105" idx="7"/>
+            <a:endCxn id="89" idx="2"/>
+          </p:cNvCxnSpPr>
+          <p:nvPr/>
+        </p:nvCxnSpPr>
+        <p:spPr>
+          <a:xfrm rot="5400000" flipH="1" flipV="1">
+            <a:off x="7088249" y="1095080"/>
+            <a:ext cx="452819" cy="2049076"/>
+          </a:xfrm>
+          <a:prstGeom prst="bentConnector2">
+            <a:avLst/>
+          </a:prstGeom>
+          <a:ln>
+            <a:headEnd type="triangle"/>
+            <a:tailEnd type="triangle"/>
+          </a:ln>
+        </p:spPr>
+        <p:style>
+          <a:lnRef idx="1">
+            <a:schemeClr val="accent1"/>
+          </a:lnRef>
+          <a:fillRef idx="0">
+            <a:schemeClr val="accent1"/>
+          </a:fillRef>
+          <a:effectRef idx="0">
+            <a:schemeClr val="accent1"/>
+          </a:effectRef>
+          <a:fontRef idx="minor">
+            <a:schemeClr val="tx1"/>
+          </a:fontRef>
+        </p:style>
+      </p:cxnSp>
+      <p:cxnSp>
+        <p:nvCxnSpPr>
+          <p:cNvPr id="94" name="Connector: Elbow 16">
+            <a:extLst>
+              <a:ext uri="{FF2B5EF4-FFF2-40B4-BE49-F238E27FC236}">
+                <a16:creationId xmlns:a16="http://schemas.microsoft.com/office/drawing/2014/main" id="{16FB3E99-FB2D-48D6-AA1C-19EBC8A5C305}"/>
+              </a:ext>
+            </a:extLst>
+          </p:cNvPr>
+          <p:cNvCxnSpPr>
+            <a:cxnSpLocks/>
+            <a:stCxn id="105" idx="0"/>
+            <a:endCxn id="90" idx="0"/>
+          </p:cNvCxnSpPr>
+          <p:nvPr/>
+        </p:nvCxnSpPr>
+        <p:spPr>
+          <a:xfrm rot="5400000" flipH="1" flipV="1">
+            <a:off x="7576343" y="202596"/>
+            <a:ext cx="554829" cy="3554905"/>
+          </a:xfrm>
+          <a:prstGeom prst="bentConnector3">
+            <a:avLst>
+              <a:gd name="adj1" fmla="val 141202"/>
+            </a:avLst>
+          </a:prstGeom>
+          <a:ln>
+            <a:headEnd type="triangle"/>
+            <a:tailEnd type="triangle"/>
+          </a:ln>
+        </p:spPr>
+        <p:style>
+          <a:lnRef idx="1">
+            <a:schemeClr val="accent1"/>
+          </a:lnRef>
+          <a:fillRef idx="0">
+            <a:schemeClr val="accent1"/>
+          </a:fillRef>
+          <a:effectRef idx="0">
+            <a:schemeClr val="accent1"/>
+          </a:effectRef>
+          <a:fontRef idx="minor">
+            <a:schemeClr val="tx1"/>
+          </a:fontRef>
+        </p:style>
+      </p:cxnSp>
+      <p:cxnSp>
+        <p:nvCxnSpPr>
+          <p:cNvPr id="95" name="Connector: Elbow 16">
+            <a:extLst>
+              <a:ext uri="{FF2B5EF4-FFF2-40B4-BE49-F238E27FC236}">
+                <a16:creationId xmlns:a16="http://schemas.microsoft.com/office/drawing/2014/main" id="{4DDB7F44-670A-4BA4-B089-105D96ABB025}"/>
+              </a:ext>
+            </a:extLst>
+          </p:cNvPr>
+          <p:cNvCxnSpPr>
+            <a:cxnSpLocks/>
+            <a:stCxn id="12" idx="0"/>
+            <a:endCxn id="89" idx="3"/>
+          </p:cNvCxnSpPr>
+          <p:nvPr/>
+        </p:nvCxnSpPr>
+        <p:spPr>
+          <a:xfrm rot="5400000" flipH="1" flipV="1">
+            <a:off x="7855481" y="1685181"/>
+            <a:ext cx="150438" cy="994122"/>
+          </a:xfrm>
+          <a:prstGeom prst="bentConnector3">
+            <a:avLst>
+              <a:gd name="adj1" fmla="val 50000"/>
+            </a:avLst>
+          </a:prstGeom>
+          <a:ln>
+            <a:headEnd type="triangle"/>
+            <a:tailEnd type="triangle"/>
+          </a:ln>
+        </p:spPr>
+        <p:style>
+          <a:lnRef idx="1">
+            <a:schemeClr val="accent1"/>
+          </a:lnRef>
+          <a:fillRef idx="0">
+            <a:schemeClr val="accent1"/>
+          </a:fillRef>
+          <a:effectRef idx="0">
+            <a:schemeClr val="accent1"/>
+          </a:effectRef>
+          <a:fontRef idx="minor">
+            <a:schemeClr val="tx1"/>
+          </a:fontRef>
+        </p:style>
+      </p:cxnSp>
+      <p:cxnSp>
+        <p:nvCxnSpPr>
+          <p:cNvPr id="97" name="Connector: Elbow 16">
+            <a:extLst>
+              <a:ext uri="{FF2B5EF4-FFF2-40B4-BE49-F238E27FC236}">
+                <a16:creationId xmlns:a16="http://schemas.microsoft.com/office/drawing/2014/main" id="{00359345-4C55-45DF-919D-100FDC767914}"/>
+              </a:ext>
+            </a:extLst>
+          </p:cNvPr>
+          <p:cNvCxnSpPr>
+            <a:cxnSpLocks/>
+            <a:stCxn id="90" idx="2"/>
+            <a:endCxn id="89" idx="6"/>
+          </p:cNvCxnSpPr>
+          <p:nvPr/>
+        </p:nvCxnSpPr>
+        <p:spPr>
+          <a:xfrm rot="10800000">
+            <a:off x="8943957" y="1893208"/>
+            <a:ext cx="384872" cy="111806"/>
+          </a:xfrm>
+          <a:prstGeom prst="bentConnector3">
+            <a:avLst>
+              <a:gd name="adj1" fmla="val 50000"/>
+            </a:avLst>
+          </a:prstGeom>
+          <a:ln>
+            <a:headEnd type="triangle"/>
+            <a:tailEnd type="triangle"/>
+          </a:ln>
+        </p:spPr>
+        <p:style>
+          <a:lnRef idx="1">
+            <a:schemeClr val="accent1"/>
+          </a:lnRef>
+          <a:fillRef idx="0">
+            <a:schemeClr val="accent1"/>
+          </a:fillRef>
+          <a:effectRef idx="0">
+            <a:schemeClr val="accent1"/>
+          </a:effectRef>
+          <a:fontRef idx="minor">
+            <a:schemeClr val="tx1"/>
+          </a:fontRef>
+        </p:style>
+      </p:cxnSp>
+      <p:cxnSp>
+        <p:nvCxnSpPr>
+          <p:cNvPr id="98" name="Connector: Elbow 16">
+            <a:extLst>
+              <a:ext uri="{FF2B5EF4-FFF2-40B4-BE49-F238E27FC236}">
+                <a16:creationId xmlns:a16="http://schemas.microsoft.com/office/drawing/2014/main" id="{7DA61426-FCF5-4378-BF88-E1ABD3F09492}"/>
+              </a:ext>
+            </a:extLst>
+          </p:cNvPr>
+          <p:cNvCxnSpPr>
+            <a:cxnSpLocks/>
+            <a:stCxn id="3" idx="0"/>
+            <a:endCxn id="90" idx="4"/>
+          </p:cNvCxnSpPr>
+          <p:nvPr/>
+        </p:nvCxnSpPr>
+        <p:spPr>
+          <a:xfrm rot="5400000" flipH="1" flipV="1">
+            <a:off x="8172795" y="2234981"/>
+            <a:ext cx="1386002" cy="1530828"/>
+          </a:xfrm>
+          <a:prstGeom prst="bentConnector3">
+            <a:avLst>
+              <a:gd name="adj1" fmla="val 50000"/>
+            </a:avLst>
+          </a:prstGeom>
+          <a:ln>
+            <a:headEnd type="triangle"/>
+            <a:tailEnd type="triangle"/>
+          </a:ln>
+        </p:spPr>
+        <p:style>
+          <a:lnRef idx="1">
+            <a:schemeClr val="accent1"/>
+          </a:lnRef>
+          <a:fillRef idx="0">
+            <a:schemeClr val="accent1"/>
+          </a:fillRef>
+          <a:effectRef idx="0">
+            <a:schemeClr val="accent1"/>
+          </a:effectRef>
+          <a:fontRef idx="minor">
+            <a:schemeClr val="tx1"/>
+          </a:fontRef>
+        </p:style>
+      </p:cxnSp>
+    </p:spTree>
+    <p:extLst>
+      <p:ext uri="{BB962C8B-B14F-4D97-AF65-F5344CB8AC3E}">
+        <p14:creationId xmlns:p14="http://schemas.microsoft.com/office/powerpoint/2010/main" val="4169295361"/>
       </p:ext>
     </p:extLst>
   </p:cSld>

</xml_diff>